<commit_message>
Changed typo; created file for 01
</commit_message>
<xml_diff>
--- a/Presentations/Presentations Power Point/01_Intro to Ruby.pptx
+++ b/Presentations/Presentations Power Point/01_Intro to Ruby.pptx
@@ -3824,7 +3824,7 @@
               <a:defRPr sz="3500"/>
             </a:pPr>
             <a:r>
-              <a:t>(ex: my_name = “Mariana”)</a:t>
+              <a:t>(ex: my_name = “Stephane”)</a:t>
             </a:r>
           </a:p>
         </p:txBody>
@@ -4585,7 +4585,7 @@
               </a:defRPr>
             </a:pPr>
             <a:r>
-              <a:t>name = “Mariana”</a:t>
+              <a:t>name = “Stephane”</a:t>
             </a:r>
           </a:p>
           <a:p>
@@ -4697,7 +4697,7 @@
               </a:defRPr>
             </a:pPr>
             <a:r>
-              <a:t># prints out: My name is Mariana</a:t>
+              <a:t># prints out: My name is Stephane</a:t>
             </a:r>
           </a:p>
           <a:p>

</xml_diff>

<commit_message>
New version post presentation
</commit_message>
<xml_diff>
--- a/Presentations/Presentations Power Point/01_Intro to Ruby.pptx
+++ b/Presentations/Presentations Power Point/01_Intro to Ruby.pptx
@@ -3253,14 +3253,14 @@
       </p:grpSpPr>
       <p:sp>
         <p:nvSpPr>
-          <p:cNvPr id="123" name="Puts &amp; Prints"/>
+          <p:cNvPr id="123" name="Puts &amp; Print"/>
           <p:cNvSpPr txBox="1"/>
           <p:nvPr/>
         </p:nvSpPr>
         <p:spPr>
           <a:xfrm>
-            <a:off x="3402245" y="596900"/>
-            <a:ext cx="5993893" cy="1295401"/>
+            <a:off x="3644561" y="596900"/>
+            <a:ext cx="5509261" cy="1295401"/>
           </a:xfrm>
           <a:prstGeom prst="rect">
             <a:avLst/>
@@ -3305,7 +3305,7 @@
                   <a:srgbClr val="000000"/>
                 </a:solidFill>
               </a:rPr>
-              <a:t>uts &amp; Prints</a:t>
+              <a:t>uts &amp; Print</a:t>
             </a:r>
           </a:p>
         </p:txBody>

</xml_diff>

<commit_message>
added new folder, edited powerpoint
</commit_message>
<xml_diff>
--- a/Presentations/Presentations Power Point/01_Intro to Ruby.pptx
+++ b/Presentations/Presentations Power Point/01_Intro to Ruby.pptx
@@ -1,23 +1,23 @@
 
 <file path=ppt/presentation.xml><?xml version="1.0" encoding="utf-8"?>
-<p:presentation xmlns:a="http://schemas.openxmlformats.org/drawingml/2006/main" xmlns:r="http://schemas.openxmlformats.org/officeDocument/2006/relationships" xmlns:p="http://schemas.openxmlformats.org/presentationml/2006/main" xmlns:m="http://schemas.openxmlformats.org/officeDocument/2006/math" xmlns:a14="http://schemas.microsoft.com/office/drawing/2010/main">
+<p:presentation xmlns:a="http://schemas.openxmlformats.org/drawingml/2006/main" xmlns:r="http://schemas.openxmlformats.org/officeDocument/2006/relationships" xmlns:p="http://schemas.openxmlformats.org/presentationml/2006/main">
   <p:sldMasterIdLst>
-    <p:sldMasterId id="2147483648" r:id="rId5"/>
+    <p:sldMasterId id="2147483648" r:id="rId1"/>
   </p:sldMasterIdLst>
   <p:notesMasterIdLst>
-    <p:notesMasterId r:id="rId7"/>
+    <p:notesMasterId r:id="rId12"/>
   </p:notesMasterIdLst>
   <p:sldIdLst>
-    <p:sldId id="256" r:id="rId8"/>
-    <p:sldId id="257" r:id="rId9"/>
-    <p:sldId id="258" r:id="rId10"/>
-    <p:sldId id="259" r:id="rId11"/>
-    <p:sldId id="260" r:id="rId12"/>
-    <p:sldId id="261" r:id="rId13"/>
-    <p:sldId id="262" r:id="rId14"/>
-    <p:sldId id="263" r:id="rId15"/>
-    <p:sldId id="264" r:id="rId16"/>
-    <p:sldId id="265" r:id="rId17"/>
+    <p:sldId id="256" r:id="rId2"/>
+    <p:sldId id="257" r:id="rId3"/>
+    <p:sldId id="258" r:id="rId4"/>
+    <p:sldId id="259" r:id="rId5"/>
+    <p:sldId id="260" r:id="rId6"/>
+    <p:sldId id="261" r:id="rId7"/>
+    <p:sldId id="262" r:id="rId8"/>
+    <p:sldId id="263" r:id="rId9"/>
+    <p:sldId id="264" r:id="rId10"/>
+    <p:sldId id="265" r:id="rId11"/>
   </p:sldIdLst>
   <p:sldSz cx="13004800" cy="9753600"/>
   <p:notesSz cx="6858000" cy="9144000"/>
@@ -37,7 +37,7 @@
       <a:buFontTx/>
       <a:buNone/>
       <a:tabLst/>
-      <a:defRPr b="0" baseline="0" cap="none" i="0" spc="0" strike="noStrike" sz="1800" u="none" kumimoji="0" normalizeH="0">
+      <a:defRPr kumimoji="0" sz="1800" b="0" i="0" u="none" strike="noStrike" cap="none" spc="0" normalizeH="0" baseline="0">
         <a:ln>
           <a:noFill/>
         </a:ln>
@@ -63,7 +63,7 @@
       <a:buFontTx/>
       <a:buNone/>
       <a:tabLst/>
-      <a:defRPr b="0" baseline="0" cap="none" i="0" spc="0" strike="noStrike" sz="5800" u="none" kumimoji="0" normalizeH="0">
+      <a:defRPr kumimoji="0" sz="5800" b="0" i="0" u="none" strike="noStrike" cap="none" spc="0" normalizeH="0" baseline="0">
         <a:ln>
           <a:noFill/>
         </a:ln>
@@ -93,7 +93,7 @@
       <a:buFontTx/>
       <a:buNone/>
       <a:tabLst/>
-      <a:defRPr b="0" baseline="0" cap="none" i="0" spc="0" strike="noStrike" sz="5800" u="none" kumimoji="0" normalizeH="0">
+      <a:defRPr kumimoji="0" sz="5800" b="0" i="0" u="none" strike="noStrike" cap="none" spc="0" normalizeH="0" baseline="0">
         <a:ln>
           <a:noFill/>
         </a:ln>
@@ -123,7 +123,7 @@
       <a:buFontTx/>
       <a:buNone/>
       <a:tabLst/>
-      <a:defRPr b="0" baseline="0" cap="none" i="0" spc="0" strike="noStrike" sz="5800" u="none" kumimoji="0" normalizeH="0">
+      <a:defRPr kumimoji="0" sz="5800" b="0" i="0" u="none" strike="noStrike" cap="none" spc="0" normalizeH="0" baseline="0">
         <a:ln>
           <a:noFill/>
         </a:ln>
@@ -153,7 +153,7 @@
       <a:buFontTx/>
       <a:buNone/>
       <a:tabLst/>
-      <a:defRPr b="0" baseline="0" cap="none" i="0" spc="0" strike="noStrike" sz="5800" u="none" kumimoji="0" normalizeH="0">
+      <a:defRPr kumimoji="0" sz="5800" b="0" i="0" u="none" strike="noStrike" cap="none" spc="0" normalizeH="0" baseline="0">
         <a:ln>
           <a:noFill/>
         </a:ln>
@@ -183,7 +183,7 @@
       <a:buFontTx/>
       <a:buNone/>
       <a:tabLst/>
-      <a:defRPr b="0" baseline="0" cap="none" i="0" spc="0" strike="noStrike" sz="5800" u="none" kumimoji="0" normalizeH="0">
+      <a:defRPr kumimoji="0" sz="5800" b="0" i="0" u="none" strike="noStrike" cap="none" spc="0" normalizeH="0" baseline="0">
         <a:ln>
           <a:noFill/>
         </a:ln>
@@ -213,7 +213,7 @@
       <a:buFontTx/>
       <a:buNone/>
       <a:tabLst/>
-      <a:defRPr b="0" baseline="0" cap="none" i="0" spc="0" strike="noStrike" sz="5800" u="none" kumimoji="0" normalizeH="0">
+      <a:defRPr kumimoji="0" sz="5800" b="0" i="0" u="none" strike="noStrike" cap="none" spc="0" normalizeH="0" baseline="0">
         <a:ln>
           <a:noFill/>
         </a:ln>
@@ -243,7 +243,7 @@
       <a:buFontTx/>
       <a:buNone/>
       <a:tabLst/>
-      <a:defRPr b="0" baseline="0" cap="none" i="0" spc="0" strike="noStrike" sz="5800" u="none" kumimoji="0" normalizeH="0">
+      <a:defRPr kumimoji="0" sz="5800" b="0" i="0" u="none" strike="noStrike" cap="none" spc="0" normalizeH="0" baseline="0">
         <a:ln>
           <a:noFill/>
         </a:ln>
@@ -273,7 +273,7 @@
       <a:buFontTx/>
       <a:buNone/>
       <a:tabLst/>
-      <a:defRPr b="0" baseline="0" cap="none" i="0" spc="0" strike="noStrike" sz="5800" u="none" kumimoji="0" normalizeH="0">
+      <a:defRPr kumimoji="0" sz="5800" b="0" i="0" u="none" strike="noStrike" cap="none" spc="0" normalizeH="0" baseline="0">
         <a:ln>
           <a:noFill/>
         </a:ln>
@@ -303,7 +303,7 @@
       <a:buFontTx/>
       <a:buNone/>
       <a:tabLst/>
-      <a:defRPr b="0" baseline="0" cap="none" i="0" spc="0" strike="noStrike" sz="5800" u="none" kumimoji="0" normalizeH="0">
+      <a:defRPr kumimoji="0" sz="5800" b="0" i="0" u="none" strike="noStrike" cap="none" spc="0" normalizeH="0" baseline="0">
         <a:ln>
           <a:noFill/>
         </a:ln>
@@ -322,13 +322,14 @@
 </p:presentation>
 </file>
 
-<file path=ppt/commentAuthors.xml><?xml version="1.0" encoding="utf-8"?>
-<p:cmAuthorLst xmlns:a="http://schemas.openxmlformats.org/drawingml/2006/main" xmlns:r="http://schemas.openxmlformats.org/officeDocument/2006/relationships" xmlns:p="http://schemas.openxmlformats.org/presentationml/2006/main" xmlns:m="http://schemas.openxmlformats.org/officeDocument/2006/math" xmlns:a14="http://schemas.microsoft.com/office/drawing/2010/main"/>
-</file>
-
 <file path=ppt/notesMasters/notesMaster1.xml><?xml version="1.0" encoding="utf-8"?>
-<p:notesMaster xmlns:a="http://schemas.openxmlformats.org/drawingml/2006/main" xmlns:r="http://schemas.openxmlformats.org/officeDocument/2006/relationships" xmlns:p="http://schemas.openxmlformats.org/presentationml/2006/main" xmlns:m="http://schemas.openxmlformats.org/officeDocument/2006/math" xmlns:a14="http://schemas.microsoft.com/office/drawing/2010/main">
+<p:notesMaster xmlns:a="http://schemas.openxmlformats.org/drawingml/2006/main" xmlns:r="http://schemas.openxmlformats.org/officeDocument/2006/relationships" xmlns:p="http://schemas.openxmlformats.org/presentationml/2006/main">
   <p:cSld>
+    <p:bg>
+      <p:bgRef idx="1001">
+        <a:schemeClr val="bg1"/>
+      </p:bgRef>
+    </p:bg>
     <p:spTree>
       <p:nvGrpSpPr>
         <p:cNvPr id="1" name=""/>
@@ -346,7 +347,9 @@
       <p:sp>
         <p:nvSpPr>
           <p:cNvPr id="116" name="Shape 116"/>
-          <p:cNvSpPr/>
+          <p:cNvSpPr>
+            <a:spLocks noGrp="1" noRot="1" noChangeAspect="1"/>
+          </p:cNvSpPr>
           <p:nvPr>
             <p:ph type="sldImg"/>
           </p:nvPr>
@@ -364,14 +367,16 @@
           <a:bodyPr/>
           <a:lstStyle/>
           <a:p>
-            <a:pPr/>
+            <a:endParaRPr/>
           </a:p>
         </p:txBody>
       </p:sp>
       <p:sp>
         <p:nvSpPr>
           <p:cNvPr id="117" name="Shape 117"/>
-          <p:cNvSpPr/>
+          <p:cNvSpPr>
+            <a:spLocks noGrp="1"/>
+          </p:cNvSpPr>
           <p:nvPr>
             <p:ph type="body" sz="quarter" idx="1"/>
           </p:nvPr>
@@ -389,7 +394,7 @@
           <a:bodyPr/>
           <a:lstStyle/>
           <a:p>
-            <a:pPr/>
+            <a:endParaRPr/>
           </a:p>
         </p:txBody>
       </p:sp>
@@ -501,7 +506,7 @@
 </file>
 
 <file path=ppt/slideLayouts/slideLayout1.xml><?xml version="1.0" encoding="utf-8"?>
-<p:sldLayout xmlns:a="http://schemas.openxmlformats.org/drawingml/2006/main" xmlns:r="http://schemas.openxmlformats.org/officeDocument/2006/relationships" xmlns:p="http://schemas.openxmlformats.org/presentationml/2006/main" xmlns:m="http://schemas.openxmlformats.org/officeDocument/2006/math" xmlns:a14="http://schemas.microsoft.com/office/drawing/2010/main" type="title" showMasterSp="1" showMasterPhAnim="1">
+<p:sldLayout xmlns:a="http://schemas.openxmlformats.org/drawingml/2006/main" xmlns:r="http://schemas.openxmlformats.org/officeDocument/2006/relationships" xmlns:p="http://schemas.openxmlformats.org/presentationml/2006/main" type="title">
   <p:cSld name="Titre et sous-titre">
     <p:spTree>
       <p:nvGrpSpPr>
@@ -520,7 +525,9 @@
       <p:sp>
         <p:nvSpPr>
           <p:cNvPr id="11" name="Title Text"/>
-          <p:cNvSpPr txBox="1"/>
+          <p:cNvSpPr txBox="1">
+            <a:spLocks noGrp="1"/>
+          </p:cNvSpPr>
           <p:nvPr>
             <p:ph type="title"/>
           </p:nvPr>
@@ -534,7 +541,6 @@
           <a:bodyPr/>
           <a:lstStyle/>
           <a:p>
-            <a:pPr/>
             <a:r>
               <a:t>Title Text</a:t>
             </a:r>
@@ -544,7 +550,9 @@
       <p:sp>
         <p:nvSpPr>
           <p:cNvPr id="12" name="Body Level One…"/>
-          <p:cNvSpPr txBox="1"/>
+          <p:cNvSpPr txBox="1">
+            <a:spLocks noGrp="1"/>
+          </p:cNvSpPr>
           <p:nvPr>
             <p:ph type="body" sz="quarter" idx="1"/>
           </p:nvPr>
@@ -558,7 +566,6 @@
           <a:bodyPr/>
           <a:lstStyle/>
           <a:p>
-            <a:pPr/>
             <a:r>
               <a:t>Body Level One</a:t>
             </a:r>
@@ -592,7 +599,9 @@
       <p:sp>
         <p:nvSpPr>
           <p:cNvPr id="13" name="Slide Number"/>
-          <p:cNvSpPr txBox="1"/>
+          <p:cNvSpPr txBox="1">
+            <a:spLocks noGrp="1"/>
+          </p:cNvSpPr>
           <p:nvPr>
             <p:ph type="sldNum" sz="quarter" idx="2"/>
           </p:nvPr>
@@ -606,8 +615,10 @@
           <a:bodyPr/>
           <a:lstStyle/>
           <a:p>
-            <a:pPr/>
-            <a:fld id="{86CB4B4D-7CA3-9044-876B-883B54F8677D}" type="slidenum"/>
+            <a:fld id="{86CB4B4D-7CA3-9044-876B-883B54F8677D}" type="slidenum">
+              <a:t>‹#›</a:t>
+            </a:fld>
+            <a:endParaRPr/>
           </a:p>
         </p:txBody>
       </p:sp>
@@ -616,12 +627,12 @@
   <p:clrMapOvr>
     <a:masterClrMapping/>
   </p:clrMapOvr>
-  <p:transition xmlns:p14="http://schemas.microsoft.com/office/powerpoint/2010/main" spd="med" advClick="1"/>
+  <p:transition spd="med"/>
 </p:sldLayout>
 </file>
 
 <file path=ppt/slideLayouts/slideLayout10.xml><?xml version="1.0" encoding="utf-8"?>
-<p:sldLayout xmlns:a="http://schemas.openxmlformats.org/drawingml/2006/main" xmlns:r="http://schemas.openxmlformats.org/officeDocument/2006/relationships" xmlns:p="http://schemas.openxmlformats.org/presentationml/2006/main" xmlns:m="http://schemas.openxmlformats.org/officeDocument/2006/math" xmlns:a14="http://schemas.microsoft.com/office/drawing/2010/main" type="tx" showMasterSp="1" showMasterPhAnim="1">
+<p:sldLayout xmlns:a="http://schemas.openxmlformats.org/drawingml/2006/main" xmlns:r="http://schemas.openxmlformats.org/officeDocument/2006/relationships" xmlns:p="http://schemas.openxmlformats.org/presentationml/2006/main" type="tx">
   <p:cSld name="Citation">
     <p:spTree>
       <p:nvGrpSpPr>
@@ -640,7 +651,9 @@
       <p:sp>
         <p:nvSpPr>
           <p:cNvPr id="93" name="-Gilles Allain"/>
-          <p:cNvSpPr/>
+          <p:cNvSpPr>
+            <a:spLocks noGrp="1"/>
+          </p:cNvSpPr>
           <p:nvPr>
             <p:ph type="body" sz="quarter" idx="13"/>
           </p:nvPr>
@@ -669,7 +682,6 @@
             </a:lvl1pPr>
           </a:lstStyle>
           <a:p>
-            <a:pPr/>
             <a:r>
               <a:t>-Gilles Allain</a:t>
             </a:r>
@@ -679,7 +691,9 @@
       <p:sp>
         <p:nvSpPr>
           <p:cNvPr id="94" name="« Saisissez une citation ici. »"/>
-          <p:cNvSpPr/>
+          <p:cNvSpPr>
+            <a:spLocks noGrp="1"/>
+          </p:cNvSpPr>
           <p:nvPr>
             <p:ph type="body" sz="quarter" idx="14"/>
           </p:nvPr>
@@ -703,7 +717,6 @@
             </a:lvl1pPr>
           </a:lstStyle>
           <a:p>
-            <a:pPr/>
             <a:r>
               <a:t>« Saisissez une citation ici. » </a:t>
             </a:r>
@@ -713,7 +726,9 @@
       <p:sp>
         <p:nvSpPr>
           <p:cNvPr id="95" name="Slide Number"/>
-          <p:cNvSpPr txBox="1"/>
+          <p:cNvSpPr txBox="1">
+            <a:spLocks noGrp="1"/>
+          </p:cNvSpPr>
           <p:nvPr>
             <p:ph type="sldNum" sz="quarter" idx="2"/>
           </p:nvPr>
@@ -727,8 +742,10 @@
           <a:bodyPr/>
           <a:lstStyle/>
           <a:p>
-            <a:pPr/>
-            <a:fld id="{86CB4B4D-7CA3-9044-876B-883B54F8677D}" type="slidenum"/>
+            <a:fld id="{86CB4B4D-7CA3-9044-876B-883B54F8677D}" type="slidenum">
+              <a:t>‹#›</a:t>
+            </a:fld>
+            <a:endParaRPr/>
           </a:p>
         </p:txBody>
       </p:sp>
@@ -737,12 +754,12 @@
   <p:clrMapOvr>
     <a:masterClrMapping/>
   </p:clrMapOvr>
-  <p:transition xmlns:p14="http://schemas.microsoft.com/office/powerpoint/2010/main" spd="med" advClick="1"/>
+  <p:transition spd="med"/>
 </p:sldLayout>
 </file>
 
 <file path=ppt/slideLayouts/slideLayout11.xml><?xml version="1.0" encoding="utf-8"?>
-<p:sldLayout xmlns:a="http://schemas.openxmlformats.org/drawingml/2006/main" xmlns:r="http://schemas.openxmlformats.org/officeDocument/2006/relationships" xmlns:p="http://schemas.openxmlformats.org/presentationml/2006/main" xmlns:m="http://schemas.openxmlformats.org/officeDocument/2006/math" xmlns:a14="http://schemas.microsoft.com/office/drawing/2010/main" type="tx" showMasterSp="1" showMasterPhAnim="1">
+<p:sldLayout xmlns:a="http://schemas.openxmlformats.org/drawingml/2006/main" xmlns:r="http://schemas.openxmlformats.org/officeDocument/2006/relationships" xmlns:p="http://schemas.openxmlformats.org/presentationml/2006/main" type="tx">
   <p:cSld name="Photo">
     <p:spTree>
       <p:nvGrpSpPr>
@@ -761,7 +778,9 @@
       <p:sp>
         <p:nvSpPr>
           <p:cNvPr id="102" name="Image"/>
-          <p:cNvSpPr/>
+          <p:cNvSpPr>
+            <a:spLocks noGrp="1"/>
+          </p:cNvSpPr>
           <p:nvPr>
             <p:ph type="pic" idx="13"/>
           </p:nvPr>
@@ -781,14 +800,16 @@
           </a:bodyPr>
           <a:lstStyle/>
           <a:p>
-            <a:pPr/>
+            <a:endParaRPr/>
           </a:p>
         </p:txBody>
       </p:sp>
       <p:sp>
         <p:nvSpPr>
           <p:cNvPr id="103" name="Slide Number"/>
-          <p:cNvSpPr txBox="1"/>
+          <p:cNvSpPr txBox="1">
+            <a:spLocks noGrp="1"/>
+          </p:cNvSpPr>
           <p:nvPr>
             <p:ph type="sldNum" sz="quarter" idx="2"/>
           </p:nvPr>
@@ -802,8 +823,10 @@
           <a:bodyPr/>
           <a:lstStyle/>
           <a:p>
-            <a:pPr/>
-            <a:fld id="{86CB4B4D-7CA3-9044-876B-883B54F8677D}" type="slidenum"/>
+            <a:fld id="{86CB4B4D-7CA3-9044-876B-883B54F8677D}" type="slidenum">
+              <a:t>‹#›</a:t>
+            </a:fld>
+            <a:endParaRPr/>
           </a:p>
         </p:txBody>
       </p:sp>
@@ -812,12 +835,12 @@
   <p:clrMapOvr>
     <a:masterClrMapping/>
   </p:clrMapOvr>
-  <p:transition xmlns:p14="http://schemas.microsoft.com/office/powerpoint/2010/main" spd="med" advClick="1"/>
+  <p:transition spd="med"/>
 </p:sldLayout>
 </file>
 
 <file path=ppt/slideLayouts/slideLayout12.xml><?xml version="1.0" encoding="utf-8"?>
-<p:sldLayout xmlns:a="http://schemas.openxmlformats.org/drawingml/2006/main" xmlns:r="http://schemas.openxmlformats.org/officeDocument/2006/relationships" xmlns:p="http://schemas.openxmlformats.org/presentationml/2006/main" xmlns:m="http://schemas.openxmlformats.org/officeDocument/2006/math" xmlns:a14="http://schemas.microsoft.com/office/drawing/2010/main" type="tx" showMasterSp="1" showMasterPhAnim="1">
+<p:sldLayout xmlns:a="http://schemas.openxmlformats.org/drawingml/2006/main" xmlns:r="http://schemas.openxmlformats.org/officeDocument/2006/relationships" xmlns:p="http://schemas.openxmlformats.org/presentationml/2006/main" type="tx">
   <p:cSld name="Vierge">
     <p:spTree>
       <p:nvGrpSpPr>
@@ -836,7 +859,9 @@
       <p:sp>
         <p:nvSpPr>
           <p:cNvPr id="110" name="Slide Number"/>
-          <p:cNvSpPr txBox="1"/>
+          <p:cNvSpPr txBox="1">
+            <a:spLocks noGrp="1"/>
+          </p:cNvSpPr>
           <p:nvPr>
             <p:ph type="sldNum" sz="quarter" idx="2"/>
           </p:nvPr>
@@ -850,8 +875,10 @@
           <a:bodyPr/>
           <a:lstStyle/>
           <a:p>
-            <a:pPr/>
-            <a:fld id="{86CB4B4D-7CA3-9044-876B-883B54F8677D}" type="slidenum"/>
+            <a:fld id="{86CB4B4D-7CA3-9044-876B-883B54F8677D}" type="slidenum">
+              <a:t>‹#›</a:t>
+            </a:fld>
+            <a:endParaRPr/>
           </a:p>
         </p:txBody>
       </p:sp>
@@ -860,12 +887,12 @@
   <p:clrMapOvr>
     <a:masterClrMapping/>
   </p:clrMapOvr>
-  <p:transition xmlns:p14="http://schemas.microsoft.com/office/powerpoint/2010/main" spd="med" advClick="1"/>
+  <p:transition spd="med"/>
 </p:sldLayout>
 </file>
 
 <file path=ppt/slideLayouts/slideLayout2.xml><?xml version="1.0" encoding="utf-8"?>
-<p:sldLayout xmlns:a="http://schemas.openxmlformats.org/drawingml/2006/main" xmlns:r="http://schemas.openxmlformats.org/officeDocument/2006/relationships" xmlns:p="http://schemas.openxmlformats.org/presentationml/2006/main" xmlns:m="http://schemas.openxmlformats.org/officeDocument/2006/math" xmlns:a14="http://schemas.microsoft.com/office/drawing/2010/main" type="tx" showMasterSp="1" showMasterPhAnim="1">
+<p:sldLayout xmlns:a="http://schemas.openxmlformats.org/drawingml/2006/main" xmlns:r="http://schemas.openxmlformats.org/officeDocument/2006/relationships" xmlns:p="http://schemas.openxmlformats.org/presentationml/2006/main" type="tx">
   <p:cSld name="Photo - Horizontale">
     <p:spTree>
       <p:nvGrpSpPr>
@@ -884,7 +911,9 @@
       <p:sp>
         <p:nvSpPr>
           <p:cNvPr id="20" name="Image"/>
-          <p:cNvSpPr/>
+          <p:cNvSpPr>
+            <a:spLocks noGrp="1"/>
+          </p:cNvSpPr>
           <p:nvPr>
             <p:ph type="pic" sz="half" idx="13"/>
           </p:nvPr>
@@ -904,14 +933,16 @@
           </a:bodyPr>
           <a:lstStyle/>
           <a:p>
-            <a:pPr/>
+            <a:endParaRPr/>
           </a:p>
         </p:txBody>
       </p:sp>
       <p:sp>
         <p:nvSpPr>
           <p:cNvPr id="21" name="Title Text"/>
-          <p:cNvSpPr txBox="1"/>
+          <p:cNvSpPr txBox="1">
+            <a:spLocks noGrp="1"/>
+          </p:cNvSpPr>
           <p:nvPr>
             <p:ph type="title"/>
           </p:nvPr>
@@ -929,7 +960,6 @@
           <a:bodyPr/>
           <a:lstStyle/>
           <a:p>
-            <a:pPr/>
             <a:r>
               <a:t>Title Text</a:t>
             </a:r>
@@ -939,7 +969,9 @@
       <p:sp>
         <p:nvSpPr>
           <p:cNvPr id="22" name="Body Level One…"/>
-          <p:cNvSpPr txBox="1"/>
+          <p:cNvSpPr txBox="1">
+            <a:spLocks noGrp="1"/>
+          </p:cNvSpPr>
           <p:nvPr>
             <p:ph type="body" sz="quarter" idx="1"/>
           </p:nvPr>
@@ -957,7 +989,6 @@
           <a:bodyPr/>
           <a:lstStyle/>
           <a:p>
-            <a:pPr/>
             <a:r>
               <a:t>Body Level One</a:t>
             </a:r>
@@ -991,7 +1022,9 @@
       <p:sp>
         <p:nvSpPr>
           <p:cNvPr id="23" name="Slide Number"/>
-          <p:cNvSpPr txBox="1"/>
+          <p:cNvSpPr txBox="1">
+            <a:spLocks noGrp="1"/>
+          </p:cNvSpPr>
           <p:nvPr>
             <p:ph type="sldNum" sz="quarter" idx="2"/>
           </p:nvPr>
@@ -1009,8 +1042,10 @@
           <a:bodyPr/>
           <a:lstStyle/>
           <a:p>
-            <a:pPr/>
-            <a:fld id="{86CB4B4D-7CA3-9044-876B-883B54F8677D}" type="slidenum"/>
+            <a:fld id="{86CB4B4D-7CA3-9044-876B-883B54F8677D}" type="slidenum">
+              <a:t>‹#›</a:t>
+            </a:fld>
+            <a:endParaRPr/>
           </a:p>
         </p:txBody>
       </p:sp>
@@ -1019,12 +1054,12 @@
   <p:clrMapOvr>
     <a:masterClrMapping/>
   </p:clrMapOvr>
-  <p:transition xmlns:p14="http://schemas.microsoft.com/office/powerpoint/2010/main" spd="med" advClick="1"/>
+  <p:transition spd="med"/>
 </p:sldLayout>
 </file>
 
 <file path=ppt/slideLayouts/slideLayout3.xml><?xml version="1.0" encoding="utf-8"?>
-<p:sldLayout xmlns:a="http://schemas.openxmlformats.org/drawingml/2006/main" xmlns:r="http://schemas.openxmlformats.org/officeDocument/2006/relationships" xmlns:p="http://schemas.openxmlformats.org/presentationml/2006/main" xmlns:m="http://schemas.openxmlformats.org/officeDocument/2006/math" xmlns:a14="http://schemas.microsoft.com/office/drawing/2010/main" type="tx" showMasterSp="1" showMasterPhAnim="1">
+<p:sldLayout xmlns:a="http://schemas.openxmlformats.org/drawingml/2006/main" xmlns:r="http://schemas.openxmlformats.org/officeDocument/2006/relationships" xmlns:p="http://schemas.openxmlformats.org/presentationml/2006/main" type="tx">
   <p:cSld name="Titre - Centré">
     <p:spTree>
       <p:nvGrpSpPr>
@@ -1043,7 +1078,9 @@
       <p:sp>
         <p:nvSpPr>
           <p:cNvPr id="30" name="Title Text"/>
-          <p:cNvSpPr txBox="1"/>
+          <p:cNvSpPr txBox="1">
+            <a:spLocks noGrp="1"/>
+          </p:cNvSpPr>
           <p:nvPr>
             <p:ph type="title"/>
           </p:nvPr>
@@ -1061,7 +1098,6 @@
           <a:bodyPr anchor="ctr"/>
           <a:lstStyle/>
           <a:p>
-            <a:pPr/>
             <a:r>
               <a:t>Title Text</a:t>
             </a:r>
@@ -1071,7 +1107,9 @@
       <p:sp>
         <p:nvSpPr>
           <p:cNvPr id="31" name="Slide Number"/>
-          <p:cNvSpPr txBox="1"/>
+          <p:cNvSpPr txBox="1">
+            <a:spLocks noGrp="1"/>
+          </p:cNvSpPr>
           <p:nvPr>
             <p:ph type="sldNum" sz="quarter" idx="2"/>
           </p:nvPr>
@@ -1085,8 +1123,10 @@
           <a:bodyPr/>
           <a:lstStyle/>
           <a:p>
-            <a:pPr/>
-            <a:fld id="{86CB4B4D-7CA3-9044-876B-883B54F8677D}" type="slidenum"/>
+            <a:fld id="{86CB4B4D-7CA3-9044-876B-883B54F8677D}" type="slidenum">
+              <a:t>‹#›</a:t>
+            </a:fld>
+            <a:endParaRPr/>
           </a:p>
         </p:txBody>
       </p:sp>
@@ -1095,12 +1135,12 @@
   <p:clrMapOvr>
     <a:masterClrMapping/>
   </p:clrMapOvr>
-  <p:transition xmlns:p14="http://schemas.microsoft.com/office/powerpoint/2010/main" spd="med" advClick="1"/>
+  <p:transition spd="med"/>
 </p:sldLayout>
 </file>
 
 <file path=ppt/slideLayouts/slideLayout4.xml><?xml version="1.0" encoding="utf-8"?>
-<p:sldLayout xmlns:a="http://schemas.openxmlformats.org/drawingml/2006/main" xmlns:r="http://schemas.openxmlformats.org/officeDocument/2006/relationships" xmlns:p="http://schemas.openxmlformats.org/presentationml/2006/main" xmlns:m="http://schemas.openxmlformats.org/officeDocument/2006/math" xmlns:a14="http://schemas.microsoft.com/office/drawing/2010/main" type="tx" showMasterSp="1" showMasterPhAnim="1">
+<p:sldLayout xmlns:a="http://schemas.openxmlformats.org/drawingml/2006/main" xmlns:r="http://schemas.openxmlformats.org/officeDocument/2006/relationships" xmlns:p="http://schemas.openxmlformats.org/presentationml/2006/main" type="tx">
   <p:cSld name="Photo - Verticale">
     <p:spTree>
       <p:nvGrpSpPr>
@@ -1119,7 +1159,9 @@
       <p:sp>
         <p:nvSpPr>
           <p:cNvPr id="38" name="Image"/>
-          <p:cNvSpPr/>
+          <p:cNvSpPr>
+            <a:spLocks noGrp="1"/>
+          </p:cNvSpPr>
           <p:nvPr>
             <p:ph type="pic" idx="13"/>
           </p:nvPr>
@@ -1139,14 +1181,16 @@
           </a:bodyPr>
           <a:lstStyle/>
           <a:p>
-            <a:pPr/>
+            <a:endParaRPr/>
           </a:p>
         </p:txBody>
       </p:sp>
       <p:sp>
         <p:nvSpPr>
           <p:cNvPr id="39" name="Title Text"/>
-          <p:cNvSpPr txBox="1"/>
+          <p:cNvSpPr txBox="1">
+            <a:spLocks noGrp="1"/>
+          </p:cNvSpPr>
           <p:nvPr>
             <p:ph type="title"/>
           </p:nvPr>
@@ -1168,7 +1212,6 @@
             </a:lvl1pPr>
           </a:lstStyle>
           <a:p>
-            <a:pPr/>
             <a:r>
               <a:t>Title Text</a:t>
             </a:r>
@@ -1178,7 +1221,9 @@
       <p:sp>
         <p:nvSpPr>
           <p:cNvPr id="40" name="Body Level One…"/>
-          <p:cNvSpPr txBox="1"/>
+          <p:cNvSpPr txBox="1">
+            <a:spLocks noGrp="1"/>
+          </p:cNvSpPr>
           <p:nvPr>
             <p:ph type="body" sz="quarter" idx="1"/>
           </p:nvPr>
@@ -1196,7 +1241,6 @@
           <a:bodyPr/>
           <a:lstStyle/>
           <a:p>
-            <a:pPr/>
             <a:r>
               <a:t>Body Level One</a:t>
             </a:r>
@@ -1230,7 +1274,9 @@
       <p:sp>
         <p:nvSpPr>
           <p:cNvPr id="41" name="Slide Number"/>
-          <p:cNvSpPr txBox="1"/>
+          <p:cNvSpPr txBox="1">
+            <a:spLocks noGrp="1"/>
+          </p:cNvSpPr>
           <p:nvPr>
             <p:ph type="sldNum" sz="quarter" idx="2"/>
           </p:nvPr>
@@ -1244,8 +1290,10 @@
           <a:bodyPr/>
           <a:lstStyle/>
           <a:p>
-            <a:pPr/>
-            <a:fld id="{86CB4B4D-7CA3-9044-876B-883B54F8677D}" type="slidenum"/>
+            <a:fld id="{86CB4B4D-7CA3-9044-876B-883B54F8677D}" type="slidenum">
+              <a:t>‹#›</a:t>
+            </a:fld>
+            <a:endParaRPr/>
           </a:p>
         </p:txBody>
       </p:sp>
@@ -1254,12 +1302,12 @@
   <p:clrMapOvr>
     <a:masterClrMapping/>
   </p:clrMapOvr>
-  <p:transition xmlns:p14="http://schemas.microsoft.com/office/powerpoint/2010/main" spd="med" advClick="1"/>
+  <p:transition spd="med"/>
 </p:sldLayout>
 </file>
 
 <file path=ppt/slideLayouts/slideLayout5.xml><?xml version="1.0" encoding="utf-8"?>
-<p:sldLayout xmlns:a="http://schemas.openxmlformats.org/drawingml/2006/main" xmlns:r="http://schemas.openxmlformats.org/officeDocument/2006/relationships" xmlns:p="http://schemas.openxmlformats.org/presentationml/2006/main" xmlns:m="http://schemas.openxmlformats.org/officeDocument/2006/math" xmlns:a14="http://schemas.microsoft.com/office/drawing/2010/main" type="tx" showMasterSp="1" showMasterPhAnim="1">
+<p:sldLayout xmlns:a="http://schemas.openxmlformats.org/drawingml/2006/main" xmlns:r="http://schemas.openxmlformats.org/officeDocument/2006/relationships" xmlns:p="http://schemas.openxmlformats.org/presentationml/2006/main" type="tx">
   <p:cSld name="Titre - Haut">
     <p:spTree>
       <p:nvGrpSpPr>
@@ -1278,7 +1326,9 @@
       <p:sp>
         <p:nvSpPr>
           <p:cNvPr id="48" name="Title Text"/>
-          <p:cNvSpPr txBox="1"/>
+          <p:cNvSpPr txBox="1">
+            <a:spLocks noGrp="1"/>
+          </p:cNvSpPr>
           <p:nvPr>
             <p:ph type="title"/>
           </p:nvPr>
@@ -1296,7 +1346,6 @@
           <a:bodyPr anchor="ctr"/>
           <a:lstStyle/>
           <a:p>
-            <a:pPr/>
             <a:r>
               <a:t>Title Text</a:t>
             </a:r>
@@ -1306,7 +1355,9 @@
       <p:sp>
         <p:nvSpPr>
           <p:cNvPr id="49" name="Slide Number"/>
-          <p:cNvSpPr txBox="1"/>
+          <p:cNvSpPr txBox="1">
+            <a:spLocks noGrp="1"/>
+          </p:cNvSpPr>
           <p:nvPr>
             <p:ph type="sldNum" sz="quarter" idx="2"/>
           </p:nvPr>
@@ -1320,8 +1371,10 @@
           <a:bodyPr/>
           <a:lstStyle/>
           <a:p>
-            <a:pPr/>
-            <a:fld id="{86CB4B4D-7CA3-9044-876B-883B54F8677D}" type="slidenum"/>
+            <a:fld id="{86CB4B4D-7CA3-9044-876B-883B54F8677D}" type="slidenum">
+              <a:t>‹#›</a:t>
+            </a:fld>
+            <a:endParaRPr/>
           </a:p>
         </p:txBody>
       </p:sp>
@@ -1330,12 +1383,12 @@
   <p:clrMapOvr>
     <a:masterClrMapping/>
   </p:clrMapOvr>
-  <p:transition xmlns:p14="http://schemas.microsoft.com/office/powerpoint/2010/main" spd="med" advClick="1"/>
+  <p:transition spd="med"/>
 </p:sldLayout>
 </file>
 
 <file path=ppt/slideLayouts/slideLayout6.xml><?xml version="1.0" encoding="utf-8"?>
-<p:sldLayout xmlns:a="http://schemas.openxmlformats.org/drawingml/2006/main" xmlns:r="http://schemas.openxmlformats.org/officeDocument/2006/relationships" xmlns:p="http://schemas.openxmlformats.org/presentationml/2006/main" xmlns:m="http://schemas.openxmlformats.org/officeDocument/2006/math" xmlns:a14="http://schemas.microsoft.com/office/drawing/2010/main" type="tx" showMasterSp="1" showMasterPhAnim="1">
+<p:sldLayout xmlns:a="http://schemas.openxmlformats.org/drawingml/2006/main" xmlns:r="http://schemas.openxmlformats.org/officeDocument/2006/relationships" xmlns:p="http://schemas.openxmlformats.org/presentationml/2006/main" type="tx">
   <p:cSld name="Titre et puces">
     <p:spTree>
       <p:nvGrpSpPr>
@@ -1354,7 +1407,9 @@
       <p:sp>
         <p:nvSpPr>
           <p:cNvPr id="56" name="Title Text"/>
-          <p:cNvSpPr txBox="1"/>
+          <p:cNvSpPr txBox="1">
+            <a:spLocks noGrp="1"/>
+          </p:cNvSpPr>
           <p:nvPr>
             <p:ph type="title"/>
           </p:nvPr>
@@ -1372,7 +1427,6 @@
           <a:bodyPr anchor="ctr"/>
           <a:lstStyle/>
           <a:p>
-            <a:pPr/>
             <a:r>
               <a:t>Title Text</a:t>
             </a:r>
@@ -1382,7 +1436,9 @@
       <p:sp>
         <p:nvSpPr>
           <p:cNvPr id="57" name="Body Level One…"/>
-          <p:cNvSpPr txBox="1"/>
+          <p:cNvSpPr txBox="1">
+            <a:spLocks noGrp="1"/>
+          </p:cNvSpPr>
           <p:nvPr>
             <p:ph type="body" sz="half" idx="1"/>
           </p:nvPr>
@@ -1441,7 +1497,6 @@
             </a:lvl5pPr>
           </a:lstStyle>
           <a:p>
-            <a:pPr/>
             <a:r>
               <a:t>Body Level One</a:t>
             </a:r>
@@ -1475,7 +1530,9 @@
       <p:sp>
         <p:nvSpPr>
           <p:cNvPr id="58" name="Slide Number"/>
-          <p:cNvSpPr txBox="1"/>
+          <p:cNvSpPr txBox="1">
+            <a:spLocks noGrp="1"/>
+          </p:cNvSpPr>
           <p:nvPr>
             <p:ph type="sldNum" sz="quarter" idx="2"/>
           </p:nvPr>
@@ -1489,8 +1546,10 @@
           <a:bodyPr/>
           <a:lstStyle/>
           <a:p>
-            <a:pPr/>
-            <a:fld id="{86CB4B4D-7CA3-9044-876B-883B54F8677D}" type="slidenum"/>
+            <a:fld id="{86CB4B4D-7CA3-9044-876B-883B54F8677D}" type="slidenum">
+              <a:t>‹#›</a:t>
+            </a:fld>
+            <a:endParaRPr/>
           </a:p>
         </p:txBody>
       </p:sp>
@@ -1499,12 +1558,12 @@
   <p:clrMapOvr>
     <a:masterClrMapping/>
   </p:clrMapOvr>
-  <p:transition xmlns:p14="http://schemas.microsoft.com/office/powerpoint/2010/main" spd="med" advClick="1"/>
+  <p:transition spd="med"/>
 </p:sldLayout>
 </file>
 
 <file path=ppt/slideLayouts/slideLayout7.xml><?xml version="1.0" encoding="utf-8"?>
-<p:sldLayout xmlns:a="http://schemas.openxmlformats.org/drawingml/2006/main" xmlns:r="http://schemas.openxmlformats.org/officeDocument/2006/relationships" xmlns:p="http://schemas.openxmlformats.org/presentationml/2006/main" xmlns:m="http://schemas.openxmlformats.org/officeDocument/2006/math" xmlns:a14="http://schemas.microsoft.com/office/drawing/2010/main" type="tx" showMasterSp="1" showMasterPhAnim="1">
+<p:sldLayout xmlns:a="http://schemas.openxmlformats.org/drawingml/2006/main" xmlns:r="http://schemas.openxmlformats.org/officeDocument/2006/relationships" xmlns:p="http://schemas.openxmlformats.org/presentationml/2006/main" type="tx">
   <p:cSld name="Titre, puces et photo">
     <p:spTree>
       <p:nvGrpSpPr>
@@ -1523,7 +1582,9 @@
       <p:sp>
         <p:nvSpPr>
           <p:cNvPr id="65" name="Image"/>
-          <p:cNvSpPr/>
+          <p:cNvSpPr>
+            <a:spLocks noGrp="1"/>
+          </p:cNvSpPr>
           <p:nvPr>
             <p:ph type="pic" sz="half" idx="13"/>
           </p:nvPr>
@@ -1543,14 +1604,16 @@
           </a:bodyPr>
           <a:lstStyle/>
           <a:p>
-            <a:pPr/>
+            <a:endParaRPr/>
           </a:p>
         </p:txBody>
       </p:sp>
       <p:sp>
         <p:nvSpPr>
           <p:cNvPr id="66" name="Title Text"/>
-          <p:cNvSpPr txBox="1"/>
+          <p:cNvSpPr txBox="1">
+            <a:spLocks noGrp="1"/>
+          </p:cNvSpPr>
           <p:nvPr>
             <p:ph type="title"/>
           </p:nvPr>
@@ -1568,7 +1631,6 @@
           <a:bodyPr anchor="ctr"/>
           <a:lstStyle/>
           <a:p>
-            <a:pPr/>
             <a:r>
               <a:t>Title Text</a:t>
             </a:r>
@@ -1578,7 +1640,9 @@
       <p:sp>
         <p:nvSpPr>
           <p:cNvPr id="67" name="Body Level One…"/>
-          <p:cNvSpPr txBox="1"/>
+          <p:cNvSpPr txBox="1">
+            <a:spLocks noGrp="1"/>
+          </p:cNvSpPr>
           <p:nvPr>
             <p:ph type="body" sz="quarter" idx="1"/>
           </p:nvPr>
@@ -1637,7 +1701,6 @@
             </a:lvl5pPr>
           </a:lstStyle>
           <a:p>
-            <a:pPr/>
             <a:r>
               <a:t>Body Level One</a:t>
             </a:r>
@@ -1671,7 +1734,9 @@
       <p:sp>
         <p:nvSpPr>
           <p:cNvPr id="68" name="Slide Number"/>
-          <p:cNvSpPr txBox="1"/>
+          <p:cNvSpPr txBox="1">
+            <a:spLocks noGrp="1"/>
+          </p:cNvSpPr>
           <p:nvPr>
             <p:ph type="sldNum" sz="quarter" idx="2"/>
           </p:nvPr>
@@ -1685,8 +1750,10 @@
           <a:bodyPr/>
           <a:lstStyle/>
           <a:p>
-            <a:pPr/>
-            <a:fld id="{86CB4B4D-7CA3-9044-876B-883B54F8677D}" type="slidenum"/>
+            <a:fld id="{86CB4B4D-7CA3-9044-876B-883B54F8677D}" type="slidenum">
+              <a:t>‹#›</a:t>
+            </a:fld>
+            <a:endParaRPr/>
           </a:p>
         </p:txBody>
       </p:sp>
@@ -1695,12 +1762,12 @@
   <p:clrMapOvr>
     <a:masterClrMapping/>
   </p:clrMapOvr>
-  <p:transition xmlns:p14="http://schemas.microsoft.com/office/powerpoint/2010/main" spd="med" advClick="1"/>
+  <p:transition spd="med"/>
 </p:sldLayout>
 </file>
 
 <file path=ppt/slideLayouts/slideLayout8.xml><?xml version="1.0" encoding="utf-8"?>
-<p:sldLayout xmlns:a="http://schemas.openxmlformats.org/drawingml/2006/main" xmlns:r="http://schemas.openxmlformats.org/officeDocument/2006/relationships" xmlns:p="http://schemas.openxmlformats.org/presentationml/2006/main" xmlns:m="http://schemas.openxmlformats.org/officeDocument/2006/math" xmlns:a14="http://schemas.microsoft.com/office/drawing/2010/main" type="tx" showMasterSp="1" showMasterPhAnim="1">
+<p:sldLayout xmlns:a="http://schemas.openxmlformats.org/drawingml/2006/main" xmlns:r="http://schemas.openxmlformats.org/officeDocument/2006/relationships" xmlns:p="http://schemas.openxmlformats.org/presentationml/2006/main" type="tx">
   <p:cSld name="Puces">
     <p:spTree>
       <p:nvGrpSpPr>
@@ -1719,7 +1786,9 @@
       <p:sp>
         <p:nvSpPr>
           <p:cNvPr id="75" name="Body Level One…"/>
-          <p:cNvSpPr txBox="1"/>
+          <p:cNvSpPr txBox="1">
+            <a:spLocks noGrp="1"/>
+          </p:cNvSpPr>
           <p:nvPr>
             <p:ph type="body" sz="half" idx="1"/>
           </p:nvPr>
@@ -1778,7 +1847,6 @@
             </a:lvl5pPr>
           </a:lstStyle>
           <a:p>
-            <a:pPr/>
             <a:r>
               <a:t>Body Level One</a:t>
             </a:r>
@@ -1812,7 +1880,9 @@
       <p:sp>
         <p:nvSpPr>
           <p:cNvPr id="76" name="Slide Number"/>
-          <p:cNvSpPr txBox="1"/>
+          <p:cNvSpPr txBox="1">
+            <a:spLocks noGrp="1"/>
+          </p:cNvSpPr>
           <p:nvPr>
             <p:ph type="sldNum" sz="quarter" idx="2"/>
           </p:nvPr>
@@ -1826,8 +1896,10 @@
           <a:bodyPr/>
           <a:lstStyle/>
           <a:p>
-            <a:pPr/>
-            <a:fld id="{86CB4B4D-7CA3-9044-876B-883B54F8677D}" type="slidenum"/>
+            <a:fld id="{86CB4B4D-7CA3-9044-876B-883B54F8677D}" type="slidenum">
+              <a:t>‹#›</a:t>
+            </a:fld>
+            <a:endParaRPr/>
           </a:p>
         </p:txBody>
       </p:sp>
@@ -1836,12 +1908,12 @@
   <p:clrMapOvr>
     <a:masterClrMapping/>
   </p:clrMapOvr>
-  <p:transition xmlns:p14="http://schemas.microsoft.com/office/powerpoint/2010/main" spd="med" advClick="1"/>
+  <p:transition spd="med"/>
 </p:sldLayout>
 </file>
 
 <file path=ppt/slideLayouts/slideLayout9.xml><?xml version="1.0" encoding="utf-8"?>
-<p:sldLayout xmlns:a="http://schemas.openxmlformats.org/drawingml/2006/main" xmlns:r="http://schemas.openxmlformats.org/officeDocument/2006/relationships" xmlns:p="http://schemas.openxmlformats.org/presentationml/2006/main" xmlns:m="http://schemas.openxmlformats.org/officeDocument/2006/math" xmlns:a14="http://schemas.microsoft.com/office/drawing/2010/main" type="tx" showMasterSp="1" showMasterPhAnim="1">
+<p:sldLayout xmlns:a="http://schemas.openxmlformats.org/drawingml/2006/main" xmlns:r="http://schemas.openxmlformats.org/officeDocument/2006/relationships" xmlns:p="http://schemas.openxmlformats.org/presentationml/2006/main" type="tx">
   <p:cSld name="Photo - 3">
     <p:spTree>
       <p:nvGrpSpPr>
@@ -1860,7 +1932,9 @@
       <p:sp>
         <p:nvSpPr>
           <p:cNvPr id="83" name="Image"/>
-          <p:cNvSpPr/>
+          <p:cNvSpPr>
+            <a:spLocks noGrp="1"/>
+          </p:cNvSpPr>
           <p:nvPr>
             <p:ph type="pic" sz="quarter" idx="13"/>
           </p:nvPr>
@@ -1880,14 +1954,16 @@
           </a:bodyPr>
           <a:lstStyle/>
           <a:p>
-            <a:pPr/>
+            <a:endParaRPr/>
           </a:p>
         </p:txBody>
       </p:sp>
       <p:sp>
         <p:nvSpPr>
           <p:cNvPr id="84" name="Image"/>
-          <p:cNvSpPr/>
+          <p:cNvSpPr>
+            <a:spLocks noGrp="1"/>
+          </p:cNvSpPr>
           <p:nvPr>
             <p:ph type="pic" sz="quarter" idx="14"/>
           </p:nvPr>
@@ -1907,14 +1983,16 @@
           </a:bodyPr>
           <a:lstStyle/>
           <a:p>
-            <a:pPr/>
+            <a:endParaRPr/>
           </a:p>
         </p:txBody>
       </p:sp>
       <p:sp>
         <p:nvSpPr>
           <p:cNvPr id="85" name="Image"/>
-          <p:cNvSpPr/>
+          <p:cNvSpPr>
+            <a:spLocks noGrp="1"/>
+          </p:cNvSpPr>
           <p:nvPr>
             <p:ph type="pic" idx="15"/>
           </p:nvPr>
@@ -1934,14 +2012,16 @@
           </a:bodyPr>
           <a:lstStyle/>
           <a:p>
-            <a:pPr/>
+            <a:endParaRPr/>
           </a:p>
         </p:txBody>
       </p:sp>
       <p:sp>
         <p:nvSpPr>
           <p:cNvPr id="86" name="Slide Number"/>
-          <p:cNvSpPr txBox="1"/>
+          <p:cNvSpPr txBox="1">
+            <a:spLocks noGrp="1"/>
+          </p:cNvSpPr>
           <p:nvPr>
             <p:ph type="sldNum" sz="quarter" idx="2"/>
           </p:nvPr>
@@ -1955,8 +2035,10 @@
           <a:bodyPr/>
           <a:lstStyle/>
           <a:p>
-            <a:pPr/>
-            <a:fld id="{86CB4B4D-7CA3-9044-876B-883B54F8677D}" type="slidenum"/>
+            <a:fld id="{86CB4B4D-7CA3-9044-876B-883B54F8677D}" type="slidenum">
+              <a:t>‹#›</a:t>
+            </a:fld>
+            <a:endParaRPr/>
           </a:p>
         </p:txBody>
       </p:sp>
@@ -1965,18 +2047,19 @@
   <p:clrMapOvr>
     <a:masterClrMapping/>
   </p:clrMapOvr>
-  <p:transition xmlns:p14="http://schemas.microsoft.com/office/powerpoint/2010/main" spd="med" advClick="1"/>
+  <p:transition spd="med"/>
 </p:sldLayout>
 </file>
 
 <file path=ppt/slideMasters/slideMaster1.xml><?xml version="1.0" encoding="utf-8"?>
-<p:sldMaster xmlns:a="http://schemas.openxmlformats.org/drawingml/2006/main" xmlns:r="http://schemas.openxmlformats.org/officeDocument/2006/relationships" xmlns:p="http://schemas.openxmlformats.org/presentationml/2006/main" xmlns:m="http://schemas.openxmlformats.org/officeDocument/2006/math" xmlns:a14="http://schemas.microsoft.com/office/drawing/2010/main">
+<p:sldMaster xmlns:a="http://schemas.openxmlformats.org/drawingml/2006/main" xmlns:r="http://schemas.openxmlformats.org/officeDocument/2006/relationships" xmlns:p="http://schemas.openxmlformats.org/presentationml/2006/main">
   <p:cSld>
     <p:bg>
       <p:bgPr>
         <a:solidFill>
           <a:srgbClr val="FFFFFF"/>
         </a:solidFill>
+        <a:effectLst/>
       </p:bgPr>
     </p:bg>
     <p:spTree>
@@ -1996,7 +2079,9 @@
       <p:sp>
         <p:nvSpPr>
           <p:cNvPr id="2" name="Title Text"/>
-          <p:cNvSpPr txBox="1"/>
+          <p:cNvSpPr txBox="1">
+            <a:spLocks noGrp="1"/>
+          </p:cNvSpPr>
           <p:nvPr>
             <p:ph type="title"/>
           </p:nvPr>
@@ -2014,17 +2099,16 @@
           </a:ln>
           <a:extLst>
             <a:ext uri="{C572A759-6A51-4108-AA02-DFA0A04FC94B}">
-              <ma14:wrappingTextBoxFlag xmlns:ma14="http://schemas.microsoft.com/office/mac/drawingml/2011/main" val="1"/>
+              <ma14:wrappingTextBoxFlag xmlns:ma14="http://schemas.microsoft.com/office/mac/drawingml/2011/main" xmlns:a14="http://schemas.microsoft.com/office/drawing/2010/main" xmlns:m="http://schemas.openxmlformats.org/officeDocument/2006/math" xmlns="" val="1"/>
             </a:ext>
           </a:extLst>
         </p:spPr>
         <p:txBody>
           <a:bodyPr lIns="38100" tIns="38100" rIns="38100" bIns="38100" anchor="b">
-            <a:normAutofit fontScale="100000" lnSpcReduction="0"/>
+            <a:normAutofit/>
           </a:bodyPr>
           <a:lstStyle/>
           <a:p>
-            <a:pPr/>
             <a:r>
               <a:t>Title Text</a:t>
             </a:r>
@@ -2034,7 +2118,9 @@
       <p:sp>
         <p:nvSpPr>
           <p:cNvPr id="3" name="Body Level One…"/>
-          <p:cNvSpPr txBox="1"/>
+          <p:cNvSpPr txBox="1">
+            <a:spLocks noGrp="1"/>
+          </p:cNvSpPr>
           <p:nvPr>
             <p:ph type="body" idx="1"/>
           </p:nvPr>
@@ -2052,17 +2138,16 @@
           </a:ln>
           <a:extLst>
             <a:ext uri="{C572A759-6A51-4108-AA02-DFA0A04FC94B}">
-              <ma14:wrappingTextBoxFlag xmlns:ma14="http://schemas.microsoft.com/office/mac/drawingml/2011/main" val="1"/>
+              <ma14:wrappingTextBoxFlag xmlns:ma14="http://schemas.microsoft.com/office/mac/drawingml/2011/main" xmlns:a14="http://schemas.microsoft.com/office/drawing/2010/main" xmlns:m="http://schemas.openxmlformats.org/officeDocument/2006/math" xmlns="" val="1"/>
             </a:ext>
           </a:extLst>
         </p:spPr>
         <p:txBody>
           <a:bodyPr lIns="38100" tIns="38100" rIns="38100" bIns="38100">
-            <a:normAutofit fontScale="100000" lnSpcReduction="0"/>
+            <a:normAutofit/>
           </a:bodyPr>
           <a:lstStyle/>
           <a:p>
-            <a:pPr/>
             <a:r>
               <a:t>Body Level One</a:t>
             </a:r>
@@ -2096,7 +2181,9 @@
       <p:sp>
         <p:nvSpPr>
           <p:cNvPr id="4" name="Slide Number"/>
-          <p:cNvSpPr txBox="1"/>
+          <p:cNvSpPr txBox="1">
+            <a:spLocks noGrp="1"/>
+          </p:cNvSpPr>
           <p:nvPr>
             <p:ph type="sldNum" sz="quarter" idx="2"/>
           </p:nvPr>
@@ -2131,8 +2218,10 @@
             </a:lvl1pPr>
           </a:lstStyle>
           <a:p>
-            <a:pPr/>
-            <a:fld id="{86CB4B4D-7CA3-9044-876B-883B54F8677D}" type="slidenum"/>
+            <a:fld id="{86CB4B4D-7CA3-9044-876B-883B54F8677D}" type="slidenum">
+              <a:t>‹#›</a:t>
+            </a:fld>
+            <a:endParaRPr/>
           </a:p>
         </p:txBody>
       </p:sp>
@@ -2140,20 +2229,20 @@
   </p:cSld>
   <p:clrMap bg1="lt1" tx1="dk1" bg2="lt2" tx2="dk2" accent1="accent1" accent2="accent2" accent3="accent3" accent4="accent4" accent5="accent5" accent6="accent6" hlink="hlink" folHlink="folHlink"/>
   <p:sldLayoutIdLst>
-    <p:sldLayoutId id="2147483649" r:id="rId2"/>
-    <p:sldLayoutId id="2147483650" r:id="rId3"/>
-    <p:sldLayoutId id="2147483651" r:id="rId4"/>
-    <p:sldLayoutId id="2147483652" r:id="rId5"/>
-    <p:sldLayoutId id="2147483653" r:id="rId6"/>
-    <p:sldLayoutId id="2147483654" r:id="rId7"/>
-    <p:sldLayoutId id="2147483655" r:id="rId8"/>
-    <p:sldLayoutId id="2147483656" r:id="rId9"/>
-    <p:sldLayoutId id="2147483657" r:id="rId10"/>
-    <p:sldLayoutId id="2147483658" r:id="rId11"/>
-    <p:sldLayoutId id="2147483659" r:id="rId12"/>
-    <p:sldLayoutId id="2147483660" r:id="rId13"/>
+    <p:sldLayoutId id="2147483649" r:id="rId1"/>
+    <p:sldLayoutId id="2147483650" r:id="rId2"/>
+    <p:sldLayoutId id="2147483651" r:id="rId3"/>
+    <p:sldLayoutId id="2147483652" r:id="rId4"/>
+    <p:sldLayoutId id="2147483653" r:id="rId5"/>
+    <p:sldLayoutId id="2147483654" r:id="rId6"/>
+    <p:sldLayoutId id="2147483655" r:id="rId7"/>
+    <p:sldLayoutId id="2147483656" r:id="rId8"/>
+    <p:sldLayoutId id="2147483657" r:id="rId9"/>
+    <p:sldLayoutId id="2147483658" r:id="rId10"/>
+    <p:sldLayoutId id="2147483659" r:id="rId11"/>
+    <p:sldLayoutId id="2147483660" r:id="rId12"/>
   </p:sldLayoutIdLst>
-  <p:transition xmlns:p14="http://schemas.microsoft.com/office/powerpoint/2010/main" spd="med" advClick="1"/>
+  <p:transition spd="med"/>
   <p:txStyles>
     <p:titleStyle>
       <a:lvl1pPr marL="0" marR="0" indent="0" algn="ctr" defTabSz="584200" rtl="0" latinLnBrk="0">
@@ -2171,7 +2260,7 @@
         <a:buFontTx/>
         <a:buNone/>
         <a:tabLst/>
-        <a:defRPr b="0" baseline="0" cap="none" i="0" spc="0" strike="noStrike" sz="7800" u="none">
+        <a:defRPr sz="7800" b="0" i="0" u="none" strike="noStrike" cap="none" spc="0" baseline="0">
           <a:solidFill>
             <a:srgbClr val="000000"/>
           </a:solidFill>
@@ -2197,7 +2286,7 @@
         <a:buFontTx/>
         <a:buNone/>
         <a:tabLst/>
-        <a:defRPr b="0" baseline="0" cap="none" i="0" spc="0" strike="noStrike" sz="7800" u="none">
+        <a:defRPr sz="7800" b="0" i="0" u="none" strike="noStrike" cap="none" spc="0" baseline="0">
           <a:solidFill>
             <a:srgbClr val="000000"/>
           </a:solidFill>
@@ -2223,7 +2312,7 @@
         <a:buFontTx/>
         <a:buNone/>
         <a:tabLst/>
-        <a:defRPr b="0" baseline="0" cap="none" i="0" spc="0" strike="noStrike" sz="7800" u="none">
+        <a:defRPr sz="7800" b="0" i="0" u="none" strike="noStrike" cap="none" spc="0" baseline="0">
           <a:solidFill>
             <a:srgbClr val="000000"/>
           </a:solidFill>
@@ -2249,7 +2338,7 @@
         <a:buFontTx/>
         <a:buNone/>
         <a:tabLst/>
-        <a:defRPr b="0" baseline="0" cap="none" i="0" spc="0" strike="noStrike" sz="7800" u="none">
+        <a:defRPr sz="7800" b="0" i="0" u="none" strike="noStrike" cap="none" spc="0" baseline="0">
           <a:solidFill>
             <a:srgbClr val="000000"/>
           </a:solidFill>
@@ -2275,7 +2364,7 @@
         <a:buFontTx/>
         <a:buNone/>
         <a:tabLst/>
-        <a:defRPr b="0" baseline="0" cap="none" i="0" spc="0" strike="noStrike" sz="7800" u="none">
+        <a:defRPr sz="7800" b="0" i="0" u="none" strike="noStrike" cap="none" spc="0" baseline="0">
           <a:solidFill>
             <a:srgbClr val="000000"/>
           </a:solidFill>
@@ -2301,7 +2390,7 @@
         <a:buFontTx/>
         <a:buNone/>
         <a:tabLst/>
-        <a:defRPr b="0" baseline="0" cap="none" i="0" spc="0" strike="noStrike" sz="7800" u="none">
+        <a:defRPr sz="7800" b="0" i="0" u="none" strike="noStrike" cap="none" spc="0" baseline="0">
           <a:solidFill>
             <a:srgbClr val="000000"/>
           </a:solidFill>
@@ -2327,7 +2416,7 @@
         <a:buFontTx/>
         <a:buNone/>
         <a:tabLst/>
-        <a:defRPr b="0" baseline="0" cap="none" i="0" spc="0" strike="noStrike" sz="7800" u="none">
+        <a:defRPr sz="7800" b="0" i="0" u="none" strike="noStrike" cap="none" spc="0" baseline="0">
           <a:solidFill>
             <a:srgbClr val="000000"/>
           </a:solidFill>
@@ -2353,7 +2442,7 @@
         <a:buFontTx/>
         <a:buNone/>
         <a:tabLst/>
-        <a:defRPr b="0" baseline="0" cap="none" i="0" spc="0" strike="noStrike" sz="7800" u="none">
+        <a:defRPr sz="7800" b="0" i="0" u="none" strike="noStrike" cap="none" spc="0" baseline="0">
           <a:solidFill>
             <a:srgbClr val="000000"/>
           </a:solidFill>
@@ -2379,7 +2468,7 @@
         <a:buFontTx/>
         <a:buNone/>
         <a:tabLst/>
-        <a:defRPr b="0" baseline="0" cap="none" i="0" spc="0" strike="noStrike" sz="7800" u="none">
+        <a:defRPr sz="7800" b="0" i="0" u="none" strike="noStrike" cap="none" spc="0" baseline="0">
           <a:solidFill>
             <a:srgbClr val="000000"/>
           </a:solidFill>
@@ -2407,7 +2496,7 @@
         <a:buFontTx/>
         <a:buNone/>
         <a:tabLst/>
-        <a:defRPr b="0" baseline="0" cap="none" i="0" spc="0" strike="noStrike" sz="3000" u="none">
+        <a:defRPr sz="3000" b="0" i="0" u="none" strike="noStrike" cap="none" spc="0" baseline="0">
           <a:solidFill>
             <a:srgbClr val="000000"/>
           </a:solidFill>
@@ -2433,7 +2522,7 @@
         <a:buFontTx/>
         <a:buNone/>
         <a:tabLst/>
-        <a:defRPr b="0" baseline="0" cap="none" i="0" spc="0" strike="noStrike" sz="3000" u="none">
+        <a:defRPr sz="3000" b="0" i="0" u="none" strike="noStrike" cap="none" spc="0" baseline="0">
           <a:solidFill>
             <a:srgbClr val="000000"/>
           </a:solidFill>
@@ -2459,7 +2548,7 @@
         <a:buFontTx/>
         <a:buNone/>
         <a:tabLst/>
-        <a:defRPr b="0" baseline="0" cap="none" i="0" spc="0" strike="noStrike" sz="3000" u="none">
+        <a:defRPr sz="3000" b="0" i="0" u="none" strike="noStrike" cap="none" spc="0" baseline="0">
           <a:solidFill>
             <a:srgbClr val="000000"/>
           </a:solidFill>
@@ -2485,7 +2574,7 @@
         <a:buFontTx/>
         <a:buNone/>
         <a:tabLst/>
-        <a:defRPr b="0" baseline="0" cap="none" i="0" spc="0" strike="noStrike" sz="3000" u="none">
+        <a:defRPr sz="3000" b="0" i="0" u="none" strike="noStrike" cap="none" spc="0" baseline="0">
           <a:solidFill>
             <a:srgbClr val="000000"/>
           </a:solidFill>
@@ -2511,7 +2600,7 @@
         <a:buFontTx/>
         <a:buNone/>
         <a:tabLst/>
-        <a:defRPr b="0" baseline="0" cap="none" i="0" spc="0" strike="noStrike" sz="3000" u="none">
+        <a:defRPr sz="3000" b="0" i="0" u="none" strike="noStrike" cap="none" spc="0" baseline="0">
           <a:solidFill>
             <a:srgbClr val="000000"/>
           </a:solidFill>
@@ -2537,7 +2626,7 @@
         <a:buFontTx/>
         <a:buNone/>
         <a:tabLst/>
-        <a:defRPr b="0" baseline="0" cap="none" i="0" spc="0" strike="noStrike" sz="3000" u="none">
+        <a:defRPr sz="3000" b="0" i="0" u="none" strike="noStrike" cap="none" spc="0" baseline="0">
           <a:solidFill>
             <a:srgbClr val="000000"/>
           </a:solidFill>
@@ -2563,7 +2652,7 @@
         <a:buFontTx/>
         <a:buNone/>
         <a:tabLst/>
-        <a:defRPr b="0" baseline="0" cap="none" i="0" spc="0" strike="noStrike" sz="3000" u="none">
+        <a:defRPr sz="3000" b="0" i="0" u="none" strike="noStrike" cap="none" spc="0" baseline="0">
           <a:solidFill>
             <a:srgbClr val="000000"/>
           </a:solidFill>
@@ -2589,7 +2678,7 @@
         <a:buFontTx/>
         <a:buNone/>
         <a:tabLst/>
-        <a:defRPr b="0" baseline="0" cap="none" i="0" spc="0" strike="noStrike" sz="3000" u="none">
+        <a:defRPr sz="3000" b="0" i="0" u="none" strike="noStrike" cap="none" spc="0" baseline="0">
           <a:solidFill>
             <a:srgbClr val="000000"/>
           </a:solidFill>
@@ -2615,7 +2704,7 @@
         <a:buFontTx/>
         <a:buNone/>
         <a:tabLst/>
-        <a:defRPr b="0" baseline="0" cap="none" i="0" spc="0" strike="noStrike" sz="3000" u="none">
+        <a:defRPr sz="3000" b="0" i="0" u="none" strike="noStrike" cap="none" spc="0" baseline="0">
           <a:solidFill>
             <a:srgbClr val="000000"/>
           </a:solidFill>
@@ -2643,7 +2732,7 @@
         <a:buFontTx/>
         <a:buNone/>
         <a:tabLst/>
-        <a:defRPr b="0" baseline="0" cap="none" i="0" spc="0" strike="noStrike" sz="1600" u="none">
+        <a:defRPr sz="1600" b="0" i="0" u="none" strike="noStrike" cap="none" spc="0" baseline="0">
           <a:solidFill>
             <a:schemeClr val="tx1"/>
           </a:solidFill>
@@ -2669,7 +2758,7 @@
         <a:buFontTx/>
         <a:buNone/>
         <a:tabLst/>
-        <a:defRPr b="0" baseline="0" cap="none" i="0" spc="0" strike="noStrike" sz="1600" u="none">
+        <a:defRPr sz="1600" b="0" i="0" u="none" strike="noStrike" cap="none" spc="0" baseline="0">
           <a:solidFill>
             <a:schemeClr val="tx1"/>
           </a:solidFill>
@@ -2695,7 +2784,7 @@
         <a:buFontTx/>
         <a:buNone/>
         <a:tabLst/>
-        <a:defRPr b="0" baseline="0" cap="none" i="0" spc="0" strike="noStrike" sz="1600" u="none">
+        <a:defRPr sz="1600" b="0" i="0" u="none" strike="noStrike" cap="none" spc="0" baseline="0">
           <a:solidFill>
             <a:schemeClr val="tx1"/>
           </a:solidFill>
@@ -2721,7 +2810,7 @@
         <a:buFontTx/>
         <a:buNone/>
         <a:tabLst/>
-        <a:defRPr b="0" baseline="0" cap="none" i="0" spc="0" strike="noStrike" sz="1600" u="none">
+        <a:defRPr sz="1600" b="0" i="0" u="none" strike="noStrike" cap="none" spc="0" baseline="0">
           <a:solidFill>
             <a:schemeClr val="tx1"/>
           </a:solidFill>
@@ -2747,7 +2836,7 @@
         <a:buFontTx/>
         <a:buNone/>
         <a:tabLst/>
-        <a:defRPr b="0" baseline="0" cap="none" i="0" spc="0" strike="noStrike" sz="1600" u="none">
+        <a:defRPr sz="1600" b="0" i="0" u="none" strike="noStrike" cap="none" spc="0" baseline="0">
           <a:solidFill>
             <a:schemeClr val="tx1"/>
           </a:solidFill>
@@ -2773,7 +2862,7 @@
         <a:buFontTx/>
         <a:buNone/>
         <a:tabLst/>
-        <a:defRPr b="0" baseline="0" cap="none" i="0" spc="0" strike="noStrike" sz="1600" u="none">
+        <a:defRPr sz="1600" b="0" i="0" u="none" strike="noStrike" cap="none" spc="0" baseline="0">
           <a:solidFill>
             <a:schemeClr val="tx1"/>
           </a:solidFill>
@@ -2799,7 +2888,7 @@
         <a:buFontTx/>
         <a:buNone/>
         <a:tabLst/>
-        <a:defRPr b="0" baseline="0" cap="none" i="0" spc="0" strike="noStrike" sz="1600" u="none">
+        <a:defRPr sz="1600" b="0" i="0" u="none" strike="noStrike" cap="none" spc="0" baseline="0">
           <a:solidFill>
             <a:schemeClr val="tx1"/>
           </a:solidFill>
@@ -2825,7 +2914,7 @@
         <a:buFontTx/>
         <a:buNone/>
         <a:tabLst/>
-        <a:defRPr b="0" baseline="0" cap="none" i="0" spc="0" strike="noStrike" sz="1600" u="none">
+        <a:defRPr sz="1600" b="0" i="0" u="none" strike="noStrike" cap="none" spc="0" baseline="0">
           <a:solidFill>
             <a:schemeClr val="tx1"/>
           </a:solidFill>
@@ -2851,7 +2940,7 @@
         <a:buFontTx/>
         <a:buNone/>
         <a:tabLst/>
-        <a:defRPr b="0" baseline="0" cap="none" i="0" spc="0" strike="noStrike" sz="1600" u="none">
+        <a:defRPr sz="1600" b="0" i="0" u="none" strike="noStrike" cap="none" spc="0" baseline="0">
           <a:solidFill>
             <a:schemeClr val="tx1"/>
           </a:solidFill>
@@ -2868,7 +2957,7 @@
 </file>
 
 <file path=ppt/slides/slide1.xml><?xml version="1.0" encoding="utf-8"?>
-<p:sld xmlns:a="http://schemas.openxmlformats.org/drawingml/2006/main" xmlns:r="http://schemas.openxmlformats.org/officeDocument/2006/relationships" xmlns:p="http://schemas.openxmlformats.org/presentationml/2006/main" xmlns:m="http://schemas.openxmlformats.org/officeDocument/2006/math" xmlns:a14="http://schemas.microsoft.com/office/drawing/2010/main" showMasterSp="1" showMasterPhAnim="1">
+<p:sld xmlns:a="http://schemas.openxmlformats.org/drawingml/2006/main" xmlns:r="http://schemas.openxmlformats.org/officeDocument/2006/relationships" xmlns:p="http://schemas.openxmlformats.org/presentationml/2006/main">
   <p:cSld>
     <p:spTree>
       <p:nvGrpSpPr>
@@ -2903,7 +2992,7 @@
           </a:ln>
           <a:extLst>
             <a:ext uri="{C572A759-6A51-4108-AA02-DFA0A04FC94B}">
-              <ma14:wrappingTextBoxFlag xmlns:ma14="http://schemas.microsoft.com/office/mac/drawingml/2011/main" val="1"/>
+              <ma14:wrappingTextBoxFlag xmlns:ma14="http://schemas.microsoft.com/office/mac/drawingml/2011/main" xmlns:a14="http://schemas.microsoft.com/office/drawing/2010/main" xmlns:m="http://schemas.openxmlformats.org/officeDocument/2006/math" xmlns="" val="1"/>
             </a:ext>
           </a:extLst>
         </p:spPr>
@@ -2914,13 +3003,13 @@
           <a:lstStyle/>
           <a:p>
             <a:pPr>
-              <a:defRPr b="1" sz="8700">
+              <a:defRPr sz="8700" b="1">
                 <a:solidFill>
                   <a:srgbClr val="000000"/>
                 </a:solidFill>
-                <a:latin typeface="Circular Std"/>
-                <a:ea typeface="Circular Std"/>
-                <a:cs typeface="Circular Std"/>
+                <a:latin typeface="CircularStd-Bold"/>
+                <a:ea typeface="CircularStd-Bold"/>
+                <a:cs typeface="CircularStd-Bold"/>
                 <a:sym typeface="Circular Std"/>
               </a:defRPr>
             </a:pPr>
@@ -2930,13 +3019,13 @@
           </a:p>
           <a:p>
             <a:pPr>
-              <a:defRPr b="1" sz="8700">
+              <a:defRPr sz="8700" b="1">
                 <a:solidFill>
                   <a:srgbClr val="000000"/>
                 </a:solidFill>
-                <a:latin typeface="Circular Std"/>
-                <a:ea typeface="Circular Std"/>
-                <a:cs typeface="Circular Std"/>
+                <a:latin typeface="CircularStd-Bold"/>
+                <a:ea typeface="CircularStd-Bold"/>
+                <a:cs typeface="CircularStd-Bold"/>
                 <a:sym typeface="Circular Std"/>
               </a:defRPr>
             </a:pPr>
@@ -2946,13 +3035,13 @@
           </a:p>
           <a:p>
             <a:pPr>
-              <a:defRPr b="1" sz="8700">
+              <a:defRPr sz="8700" b="1">
                 <a:solidFill>
                   <a:srgbClr val="000000"/>
                 </a:solidFill>
-                <a:latin typeface="Circular Std"/>
-                <a:ea typeface="Circular Std"/>
-                <a:cs typeface="Circular Std"/>
+                <a:latin typeface="CircularStd-Bold"/>
+                <a:ea typeface="CircularStd-Bold"/>
+                <a:cs typeface="CircularStd-Bold"/>
                 <a:sym typeface="Circular Std"/>
               </a:defRPr>
             </a:pPr>
@@ -2962,26 +3051,27 @@
           </a:p>
           <a:p>
             <a:pPr>
-              <a:defRPr b="1" sz="7900">
+              <a:defRPr sz="7900" b="1">
                 <a:solidFill>
                   <a:srgbClr val="FFFFFF"/>
                 </a:solidFill>
-                <a:latin typeface="Circular Std"/>
-                <a:ea typeface="Circular Std"/>
-                <a:cs typeface="Circular Std"/>
+                <a:latin typeface="CircularStd-Bold"/>
+                <a:ea typeface="CircularStd-Bold"/>
+                <a:cs typeface="CircularStd-Bold"/>
                 <a:sym typeface="Circular Std"/>
               </a:defRPr>
             </a:pPr>
+            <a:endParaRPr/>
           </a:p>
           <a:p>
             <a:pPr>
-              <a:defRPr b="1" sz="6200">
+              <a:defRPr sz="6200" b="1">
                 <a:solidFill>
                   <a:srgbClr val="000000"/>
                 </a:solidFill>
-                <a:latin typeface="Circular Std"/>
-                <a:ea typeface="Circular Std"/>
-                <a:cs typeface="Circular Std"/>
+                <a:latin typeface="CircularStd-Bold"/>
+                <a:ea typeface="CircularStd-Bold"/>
+                <a:cs typeface="CircularStd-Bold"/>
                 <a:sym typeface="Circular Std"/>
               </a:defRPr>
             </a:pPr>
@@ -3000,9 +3090,7 @@
           <p:nvPr/>
         </p:nvPicPr>
         <p:blipFill>
-          <a:blip r:embed="rId2">
-            <a:extLst/>
-          </a:blip>
+          <a:blip r:embed="rId2"/>
           <a:stretch>
             <a:fillRect/>
           </a:stretch>
@@ -3029,9 +3117,7 @@
           <p:nvPr/>
         </p:nvPicPr>
         <p:blipFill>
-          <a:blip r:embed="rId3">
-            <a:extLst/>
-          </a:blip>
+          <a:blip r:embed="rId3"/>
           <a:stretch>
             <a:fillRect/>
           </a:stretch>
@@ -3054,12 +3140,12 @@
   <p:clrMapOvr>
     <a:masterClrMapping/>
   </p:clrMapOvr>
-  <p:transition xmlns:p14="http://schemas.microsoft.com/office/powerpoint/2010/main" spd="med" advClick="1"/>
+  <p:transition spd="med"/>
 </p:sld>
 </file>
 
 <file path=ppt/slides/slide10.xml><?xml version="1.0" encoding="utf-8"?>
-<p:sld xmlns:a="http://schemas.openxmlformats.org/drawingml/2006/main" xmlns:r="http://schemas.openxmlformats.org/officeDocument/2006/relationships" xmlns:p="http://schemas.openxmlformats.org/presentationml/2006/main" xmlns:m="http://schemas.openxmlformats.org/officeDocument/2006/math" xmlns:a14="http://schemas.microsoft.com/office/drawing/2010/main" showMasterSp="1" showMasterPhAnim="1">
+<p:sld xmlns:a="http://schemas.openxmlformats.org/drawingml/2006/main" xmlns:r="http://schemas.openxmlformats.org/officeDocument/2006/relationships" xmlns:p="http://schemas.openxmlformats.org/presentationml/2006/main">
   <p:cSld>
     <p:spTree>
       <p:nvGrpSpPr>
@@ -3111,7 +3197,7 @@
             <a:effectLst/>
             <a:extLst>
               <a:ext uri="{C572A759-6A51-4108-AA02-DFA0A04FC94B}">
-                <ma14:wrappingTextBoxFlag xmlns:ma14="http://schemas.microsoft.com/office/mac/drawingml/2011/main" val="1"/>
+                <ma14:wrappingTextBoxFlag xmlns:ma14="http://schemas.microsoft.com/office/mac/drawingml/2011/main" xmlns:a14="http://schemas.microsoft.com/office/drawing/2010/main" xmlns:m="http://schemas.openxmlformats.org/officeDocument/2006/math" xmlns="" val="1"/>
               </a:ext>
             </a:extLst>
           </p:spPr>
@@ -3133,7 +3219,6 @@
               </a:lvl1pPr>
             </a:lstStyle>
             <a:p>
-              <a:pPr/>
               <a:r>
                 <a:t>Thank</a:t>
               </a:r>
@@ -3166,7 +3251,7 @@
             <a:effectLst/>
             <a:extLst>
               <a:ext uri="{C572A759-6A51-4108-AA02-DFA0A04FC94B}">
-                <ma14:wrappingTextBoxFlag xmlns:ma14="http://schemas.microsoft.com/office/mac/drawingml/2011/main" val="1"/>
+                <ma14:wrappingTextBoxFlag xmlns:ma14="http://schemas.microsoft.com/office/mac/drawingml/2011/main" xmlns:a14="http://schemas.microsoft.com/office/drawing/2010/main" xmlns:m="http://schemas.openxmlformats.org/officeDocument/2006/math" xmlns="" val="1"/>
               </a:ext>
             </a:extLst>
           </p:spPr>
@@ -3188,7 +3273,6 @@
               </a:lvl1pPr>
             </a:lstStyle>
             <a:p>
-              <a:pPr/>
               <a:r>
                 <a:t>you.</a:t>
               </a:r>
@@ -3205,9 +3289,7 @@
           <p:nvPr/>
         </p:nvPicPr>
         <p:blipFill>
-          <a:blip r:embed="rId2">
-            <a:extLst/>
-          </a:blip>
+          <a:blip r:embed="rId2"/>
           <a:stretch>
             <a:fillRect/>
           </a:stretch>
@@ -3230,12 +3312,12 @@
   <p:clrMapOvr>
     <a:masterClrMapping/>
   </p:clrMapOvr>
-  <p:transition xmlns:p14="http://schemas.microsoft.com/office/powerpoint/2010/main" spd="med" advClick="1"/>
+  <p:transition spd="med"/>
 </p:sld>
 </file>
 
 <file path=ppt/slides/slide2.xml><?xml version="1.0" encoding="utf-8"?>
-<p:sld xmlns:a="http://schemas.openxmlformats.org/drawingml/2006/main" xmlns:r="http://schemas.openxmlformats.org/officeDocument/2006/relationships" xmlns:p="http://schemas.openxmlformats.org/presentationml/2006/main" xmlns:m="http://schemas.openxmlformats.org/officeDocument/2006/math" xmlns:a14="http://schemas.microsoft.com/office/drawing/2010/main" showMasterSp="1" showMasterPhAnim="1">
+<p:sld xmlns:a="http://schemas.openxmlformats.org/drawingml/2006/main" xmlns:r="http://schemas.openxmlformats.org/officeDocument/2006/relationships" xmlns:p="http://schemas.openxmlformats.org/presentationml/2006/main">
   <p:cSld>
     <p:spTree>
       <p:nvGrpSpPr>
@@ -3270,7 +3352,7 @@
           </a:ln>
           <a:extLst>
             <a:ext uri="{C572A759-6A51-4108-AA02-DFA0A04FC94B}">
-              <ma14:wrappingTextBoxFlag xmlns:ma14="http://schemas.microsoft.com/office/mac/drawingml/2011/main" val="1"/>
+              <ma14:wrappingTextBoxFlag xmlns:ma14="http://schemas.microsoft.com/office/mac/drawingml/2011/main" xmlns:a14="http://schemas.microsoft.com/office/drawing/2010/main" xmlns:m="http://schemas.openxmlformats.org/officeDocument/2006/math" xmlns="" val="1"/>
             </a:ext>
           </a:extLst>
         </p:spPr>
@@ -3329,7 +3411,7 @@
           </a:ln>
           <a:extLst>
             <a:ext uri="{C572A759-6A51-4108-AA02-DFA0A04FC94B}">
-              <ma14:wrappingTextBoxFlag xmlns:ma14="http://schemas.microsoft.com/office/mac/drawingml/2011/main" val="1"/>
+              <ma14:wrappingTextBoxFlag xmlns:ma14="http://schemas.microsoft.com/office/mac/drawingml/2011/main" xmlns:a14="http://schemas.microsoft.com/office/drawing/2010/main" xmlns:m="http://schemas.openxmlformats.org/officeDocument/2006/math" xmlns="" val="1"/>
             </a:ext>
           </a:extLst>
         </p:spPr>
@@ -3354,12 +3436,6 @@
               </a:rPr>
               <a:t>console</a:t>
             </a:r>
-            <a:endParaRPr>
-              <a:latin typeface="Helvetica"/>
-              <a:ea typeface="Helvetica"/>
-              <a:cs typeface="Helvetica"/>
-              <a:sym typeface="Helvetica"/>
-            </a:endParaRPr>
           </a:p>
           <a:p>
             <a:pPr marL="457200" indent="-228600" algn="l" defTabSz="457200">
@@ -3370,6 +3446,12 @@
                 <a:sym typeface="Helvetica"/>
               </a:defRPr>
             </a:pPr>
+            <a:endParaRPr>
+              <a:latin typeface="Helvetica"/>
+              <a:ea typeface="Helvetica"/>
+              <a:cs typeface="Helvetica"/>
+              <a:sym typeface="Helvetica"/>
+            </a:endParaRPr>
           </a:p>
           <a:p>
             <a:pPr marL="457200" indent="-228600" defTabSz="457200">
@@ -3384,7 +3466,6 @@
               <a:rPr b="1"/>
               <a:t>PRINT</a:t>
             </a:r>
-            <a:endParaRPr b="1"/>
           </a:p>
           <a:p>
             <a:pPr marL="457200" indent="-228600" defTabSz="457200">
@@ -3408,6 +3489,7 @@
                 <a:sym typeface="Helvetica"/>
               </a:defRPr>
             </a:pPr>
+            <a:endParaRPr/>
           </a:p>
           <a:p>
             <a:pPr marL="457200" indent="-228600" defTabSz="457200">
@@ -3422,7 +3504,6 @@
               <a:rPr b="1"/>
               <a:t>PUTS</a:t>
             </a:r>
-            <a:endParaRPr b="1"/>
           </a:p>
           <a:p>
             <a:pPr marL="457200" indent="-228600" defTabSz="457200">
@@ -3455,12 +3536,12 @@
   <p:clrMapOvr>
     <a:masterClrMapping/>
   </p:clrMapOvr>
-  <p:transition xmlns:p14="http://schemas.microsoft.com/office/powerpoint/2010/main" spd="med" advClick="1"/>
+  <p:transition spd="med"/>
 </p:sld>
 </file>
 
 <file path=ppt/slides/slide3.xml><?xml version="1.0" encoding="utf-8"?>
-<p:sld xmlns:a="http://schemas.openxmlformats.org/drawingml/2006/main" xmlns:r="http://schemas.openxmlformats.org/officeDocument/2006/relationships" xmlns:p="http://schemas.openxmlformats.org/presentationml/2006/main" xmlns:m="http://schemas.openxmlformats.org/officeDocument/2006/math" xmlns:a14="http://schemas.microsoft.com/office/drawing/2010/main" showMasterSp="1" showMasterPhAnim="1">
+<p:sld xmlns:a="http://schemas.openxmlformats.org/drawingml/2006/main" xmlns:r="http://schemas.openxmlformats.org/officeDocument/2006/relationships" xmlns:p="http://schemas.openxmlformats.org/presentationml/2006/main">
   <p:cSld>
     <p:spTree>
       <p:nvGrpSpPr>
@@ -3495,7 +3576,7 @@
           </a:ln>
           <a:extLst>
             <a:ext uri="{C572A759-6A51-4108-AA02-DFA0A04FC94B}">
-              <ma14:wrappingTextBoxFlag xmlns:ma14="http://schemas.microsoft.com/office/mac/drawingml/2011/main" val="1"/>
+              <ma14:wrappingTextBoxFlag xmlns:ma14="http://schemas.microsoft.com/office/mac/drawingml/2011/main" xmlns:a14="http://schemas.microsoft.com/office/drawing/2010/main" xmlns:m="http://schemas.openxmlformats.org/officeDocument/2006/math" xmlns="" val="1"/>
             </a:ext>
           </a:extLst>
         </p:spPr>
@@ -3554,7 +3635,7 @@
           </a:ln>
           <a:extLst>
             <a:ext uri="{C572A759-6A51-4108-AA02-DFA0A04FC94B}">
-              <ma14:wrappingTextBoxFlag xmlns:ma14="http://schemas.microsoft.com/office/mac/drawingml/2011/main" val="1"/>
+              <ma14:wrappingTextBoxFlag xmlns:ma14="http://schemas.microsoft.com/office/mac/drawingml/2011/main" xmlns:a14="http://schemas.microsoft.com/office/drawing/2010/main" xmlns:m="http://schemas.openxmlformats.org/officeDocument/2006/math" xmlns="" val="1"/>
             </a:ext>
           </a:extLst>
         </p:spPr>
@@ -3591,6 +3672,7 @@
             <a:pPr>
               <a:defRPr sz="4000"/>
             </a:pPr>
+            <a:endParaRPr/>
           </a:p>
           <a:p>
             <a:pPr>
@@ -3620,6 +3702,7 @@
             <a:pPr>
               <a:defRPr sz="4000"/>
             </a:pPr>
+            <a:endParaRPr/>
           </a:p>
           <a:p>
             <a:pPr>
@@ -3652,12 +3735,12 @@
   <p:clrMapOvr>
     <a:masterClrMapping/>
   </p:clrMapOvr>
-  <p:transition xmlns:p14="http://schemas.microsoft.com/office/powerpoint/2010/main" spd="med" advClick="1"/>
+  <p:transition spd="med"/>
 </p:sld>
 </file>
 
 <file path=ppt/slides/slide4.xml><?xml version="1.0" encoding="utf-8"?>
-<p:sld xmlns:a="http://schemas.openxmlformats.org/drawingml/2006/main" xmlns:r="http://schemas.openxmlformats.org/officeDocument/2006/relationships" xmlns:p="http://schemas.openxmlformats.org/presentationml/2006/main" xmlns:m="http://schemas.openxmlformats.org/officeDocument/2006/math" xmlns:a14="http://schemas.microsoft.com/office/drawing/2010/main" showMasterSp="1" showMasterPhAnim="1">
+<p:sld xmlns:a="http://schemas.openxmlformats.org/drawingml/2006/main" xmlns:r="http://schemas.openxmlformats.org/officeDocument/2006/relationships" xmlns:p="http://schemas.openxmlformats.org/presentationml/2006/main">
   <p:cSld>
     <p:spTree>
       <p:nvGrpSpPr>
@@ -3692,7 +3775,7 @@
           </a:ln>
           <a:extLst>
             <a:ext uri="{C572A759-6A51-4108-AA02-DFA0A04FC94B}">
-              <ma14:wrappingTextBoxFlag xmlns:ma14="http://schemas.microsoft.com/office/mac/drawingml/2011/main" val="1"/>
+              <ma14:wrappingTextBoxFlag xmlns:ma14="http://schemas.microsoft.com/office/mac/drawingml/2011/main" xmlns:a14="http://schemas.microsoft.com/office/drawing/2010/main" xmlns:m="http://schemas.openxmlformats.org/officeDocument/2006/math" xmlns="" val="1"/>
             </a:ext>
           </a:extLst>
         </p:spPr>
@@ -3751,7 +3834,7 @@
           </a:ln>
           <a:extLst>
             <a:ext uri="{C572A759-6A51-4108-AA02-DFA0A04FC94B}">
-              <ma14:wrappingTextBoxFlag xmlns:ma14="http://schemas.microsoft.com/office/mac/drawingml/2011/main" val="1"/>
+              <ma14:wrappingTextBoxFlag xmlns:ma14="http://schemas.microsoft.com/office/mac/drawingml/2011/main" xmlns:a14="http://schemas.microsoft.com/office/drawing/2010/main" xmlns:m="http://schemas.openxmlformats.org/officeDocument/2006/math" xmlns="" val="1"/>
             </a:ext>
           </a:extLst>
         </p:spPr>
@@ -3772,6 +3855,7 @@
             <a:pPr>
               <a:defRPr sz="3500"/>
             </a:pPr>
+            <a:endParaRPr/>
           </a:p>
           <a:p>
             <a:pPr>
@@ -3785,38 +3869,28 @@
             <a:pPr>
               <a:defRPr sz="3500"/>
             </a:pPr>
+            <a:endParaRPr/>
           </a:p>
           <a:p>
             <a:pPr>
               <a:defRPr sz="3500"/>
             </a:pPr>
             <a:r>
-              <a:t>Naming a variable: always lower caps, with words separated by an underscore `</a:t>
-            </a:r>
-            <a:r>
-              <a:t>_`</a:t>
-            </a:r>
-            <a:r>
-              <a:t> (ex: my_name)</a:t>
+              <a:t>Naming a variable: always lower caps, with words separated by an underscore `_` (ex: my_name)</a:t>
             </a:r>
           </a:p>
           <a:p>
             <a:pPr>
               <a:defRPr sz="3500"/>
             </a:pPr>
+            <a:endParaRPr/>
           </a:p>
           <a:p>
             <a:pPr>
               <a:defRPr sz="3500"/>
             </a:pPr>
             <a:r>
-              <a:t>To assign a value to a variable, we use the </a:t>
-            </a:r>
-            <a:r>
-              <a:t>= </a:t>
-            </a:r>
-            <a:r>
-              <a:t>sign </a:t>
+              <a:t>To assign a value to a variable, we use the = sign </a:t>
             </a:r>
           </a:p>
           <a:p>
@@ -3834,12 +3908,12 @@
   <p:clrMapOvr>
     <a:masterClrMapping/>
   </p:clrMapOvr>
-  <p:transition xmlns:p14="http://schemas.microsoft.com/office/powerpoint/2010/main" spd="med" advClick="1"/>
+  <p:transition spd="med"/>
 </p:sld>
 </file>
 
 <file path=ppt/slides/slide5.xml><?xml version="1.0" encoding="utf-8"?>
-<p:sld xmlns:a="http://schemas.openxmlformats.org/drawingml/2006/main" xmlns:r="http://schemas.openxmlformats.org/officeDocument/2006/relationships" xmlns:p="http://schemas.openxmlformats.org/presentationml/2006/main" xmlns:m="http://schemas.openxmlformats.org/officeDocument/2006/math" xmlns:a14="http://schemas.microsoft.com/office/drawing/2010/main" showMasterSp="1" showMasterPhAnim="1">
+<p:sld xmlns:a="http://schemas.openxmlformats.org/drawingml/2006/main" xmlns:r="http://schemas.openxmlformats.org/officeDocument/2006/relationships" xmlns:p="http://schemas.openxmlformats.org/presentationml/2006/main">
   <p:cSld>
     <p:spTree>
       <p:nvGrpSpPr>
@@ -3874,7 +3948,7 @@
           </a:ln>
           <a:extLst>
             <a:ext uri="{C572A759-6A51-4108-AA02-DFA0A04FC94B}">
-              <ma14:wrappingTextBoxFlag xmlns:ma14="http://schemas.microsoft.com/office/mac/drawingml/2011/main" val="1"/>
+              <ma14:wrappingTextBoxFlag xmlns:ma14="http://schemas.microsoft.com/office/mac/drawingml/2011/main" xmlns:a14="http://schemas.microsoft.com/office/drawing/2010/main" xmlns:m="http://schemas.openxmlformats.org/officeDocument/2006/math" xmlns="" val="1"/>
             </a:ext>
           </a:extLst>
         </p:spPr>
@@ -3933,7 +4007,7 @@
           </a:ln>
           <a:extLst>
             <a:ext uri="{C572A759-6A51-4108-AA02-DFA0A04FC94B}">
-              <ma14:wrappingTextBoxFlag xmlns:ma14="http://schemas.microsoft.com/office/mac/drawingml/2011/main" val="1"/>
+              <ma14:wrappingTextBoxFlag xmlns:ma14="http://schemas.microsoft.com/office/mac/drawingml/2011/main" xmlns:a14="http://schemas.microsoft.com/office/drawing/2010/main" xmlns:m="http://schemas.openxmlformats.org/officeDocument/2006/math" xmlns="" val="1"/>
             </a:ext>
           </a:extLst>
         </p:spPr>
@@ -3954,6 +4028,7 @@
             <a:pPr>
               <a:defRPr sz="3500"/>
             </a:pPr>
+            <a:endParaRPr/>
           </a:p>
           <a:p>
             <a:pPr>
@@ -3967,6 +4042,7 @@
             <a:pPr>
               <a:defRPr sz="1500"/>
             </a:pPr>
+            <a:endParaRPr/>
           </a:p>
           <a:p>
             <a:pPr>
@@ -3980,6 +4056,7 @@
             <a:pPr>
               <a:defRPr sz="1500"/>
             </a:pPr>
+            <a:endParaRPr/>
           </a:p>
           <a:p>
             <a:pPr>
@@ -3993,6 +4070,7 @@
             <a:pPr>
               <a:defRPr sz="1500"/>
             </a:pPr>
+            <a:endParaRPr/>
           </a:p>
           <a:p>
             <a:pPr>
@@ -4006,6 +4084,7 @@
             <a:pPr>
               <a:defRPr sz="1500"/>
             </a:pPr>
+            <a:endParaRPr/>
           </a:p>
           <a:p>
             <a:pPr>
@@ -4019,6 +4098,7 @@
             <a:pPr>
               <a:defRPr sz="1500"/>
             </a:pPr>
+            <a:endParaRPr/>
           </a:p>
           <a:p>
             <a:pPr>
@@ -4035,12 +4115,12 @@
   <p:clrMapOvr>
     <a:masterClrMapping/>
   </p:clrMapOvr>
-  <p:transition xmlns:p14="http://schemas.microsoft.com/office/powerpoint/2010/main" spd="med" advClick="1"/>
+  <p:transition spd="med"/>
 </p:sld>
 </file>
 
 <file path=ppt/slides/slide6.xml><?xml version="1.0" encoding="utf-8"?>
-<p:sld xmlns:a="http://schemas.openxmlformats.org/drawingml/2006/main" xmlns:r="http://schemas.openxmlformats.org/officeDocument/2006/relationships" xmlns:p="http://schemas.openxmlformats.org/presentationml/2006/main" xmlns:m="http://schemas.openxmlformats.org/officeDocument/2006/math" xmlns:a14="http://schemas.microsoft.com/office/drawing/2010/main" showMasterSp="1" showMasterPhAnim="1">
+<p:sld xmlns:a="http://schemas.openxmlformats.org/drawingml/2006/main" xmlns:r="http://schemas.openxmlformats.org/officeDocument/2006/relationships" xmlns:p="http://schemas.openxmlformats.org/presentationml/2006/main">
   <p:cSld>
     <p:spTree>
       <p:nvGrpSpPr>
@@ -4075,7 +4155,7 @@
           </a:ln>
           <a:extLst>
             <a:ext uri="{C572A759-6A51-4108-AA02-DFA0A04FC94B}">
-              <ma14:wrappingTextBoxFlag xmlns:ma14="http://schemas.microsoft.com/office/mac/drawingml/2011/main" val="1"/>
+              <ma14:wrappingTextBoxFlag xmlns:ma14="http://schemas.microsoft.com/office/mac/drawingml/2011/main" xmlns:a14="http://schemas.microsoft.com/office/drawing/2010/main" xmlns:m="http://schemas.openxmlformats.org/officeDocument/2006/math" xmlns="" val="1"/>
             </a:ext>
           </a:extLst>
         </p:spPr>
@@ -4134,7 +4214,7 @@
           </a:ln>
           <a:extLst>
             <a:ext uri="{C572A759-6A51-4108-AA02-DFA0A04FC94B}">
-              <ma14:wrappingTextBoxFlag xmlns:ma14="http://schemas.microsoft.com/office/mac/drawingml/2011/main" val="1"/>
+              <ma14:wrappingTextBoxFlag xmlns:ma14="http://schemas.microsoft.com/office/mac/drawingml/2011/main" xmlns:a14="http://schemas.microsoft.com/office/drawing/2010/main" xmlns:m="http://schemas.openxmlformats.org/officeDocument/2006/math" xmlns="" val="1"/>
             </a:ext>
           </a:extLst>
         </p:spPr>
@@ -4155,31 +4235,21 @@
             <a:pPr>
               <a:defRPr sz="3500"/>
             </a:pPr>
+            <a:endParaRPr/>
           </a:p>
           <a:p>
             <a:pPr>
               <a:defRPr sz="3500"/>
             </a:pPr>
             <a:r>
-              <a:t>We </a:t>
-            </a:r>
-            <a:r>
-              <a:t>call</a:t>
-            </a:r>
-            <a:r>
-              <a:t> methods with a `</a:t>
-            </a:r>
-            <a:r>
-              <a:t>.` followed by</a:t>
-            </a:r>
-            <a:r>
-              <a:t> the method name</a:t>
+              <a:t>We call methods with a `.` followed by the method name</a:t>
             </a:r>
           </a:p>
           <a:p>
             <a:pPr>
               <a:defRPr sz="3500"/>
             </a:pPr>
+            <a:endParaRPr/>
           </a:p>
           <a:p>
             <a:pPr defTabSz="457200">
@@ -4198,7 +4268,7 @@
             </a:pPr>
             <a:r>
               <a:rPr>
-                <a:hlinkClick r:id="rId2" invalidUrl="" action="" tgtFrame="" tooltip="" history="1" highlightClick="0" endSnd="0"/>
+                <a:hlinkClick r:id="rId2"/>
               </a:rPr>
               <a:t>Ruby Docs for Strings</a:t>
             </a:r>
@@ -4207,19 +4277,16 @@
             <a:pPr>
               <a:defRPr sz="3500"/>
             </a:pPr>
+            <a:endParaRPr>
+              <a:hlinkClick r:id="rId2"/>
+            </a:endParaRPr>
           </a:p>
           <a:p>
             <a:pPr>
               <a:defRPr sz="3500"/>
             </a:pPr>
             <a:r>
-              <a:t>The `</a:t>
-            </a:r>
-            <a:r>
-              <a:t>!`</a:t>
-            </a:r>
-            <a:r>
-              <a:t> after the method name means the method will modify the content of the original variable </a:t>
+              <a:t>The `!` after the method name means the method will modify the content of the original variable </a:t>
             </a:r>
             <a:r>
               <a:rPr u="sng"/>
@@ -4233,12 +4300,12 @@
   <p:clrMapOvr>
     <a:masterClrMapping/>
   </p:clrMapOvr>
-  <p:transition xmlns:p14="http://schemas.microsoft.com/office/powerpoint/2010/main" spd="med" advClick="1"/>
+  <p:transition spd="med"/>
 </p:sld>
 </file>
 
 <file path=ppt/slides/slide7.xml><?xml version="1.0" encoding="utf-8"?>
-<p:sld xmlns:a="http://schemas.openxmlformats.org/drawingml/2006/main" xmlns:r="http://schemas.openxmlformats.org/officeDocument/2006/relationships" xmlns:p="http://schemas.openxmlformats.org/presentationml/2006/main" xmlns:m="http://schemas.openxmlformats.org/officeDocument/2006/math" xmlns:a14="http://schemas.microsoft.com/office/drawing/2010/main" showMasterSp="1" showMasterPhAnim="1">
+<p:sld xmlns:a="http://schemas.openxmlformats.org/drawingml/2006/main" xmlns:r="http://schemas.openxmlformats.org/officeDocument/2006/relationships" xmlns:p="http://schemas.openxmlformats.org/presentationml/2006/main">
   <p:cSld>
     <p:spTree>
       <p:nvGrpSpPr>
@@ -4273,7 +4340,7 @@
           </a:ln>
           <a:extLst>
             <a:ext uri="{C572A759-6A51-4108-AA02-DFA0A04FC94B}">
-              <ma14:wrappingTextBoxFlag xmlns:ma14="http://schemas.microsoft.com/office/mac/drawingml/2011/main" val="1"/>
+              <ma14:wrappingTextBoxFlag xmlns:ma14="http://schemas.microsoft.com/office/mac/drawingml/2011/main" xmlns:a14="http://schemas.microsoft.com/office/drawing/2010/main" xmlns:m="http://schemas.openxmlformats.org/officeDocument/2006/math" xmlns="" val="1"/>
             </a:ext>
           </a:extLst>
         </p:spPr>
@@ -4332,7 +4399,7 @@
           </a:ln>
           <a:extLst>
             <a:ext uri="{C572A759-6A51-4108-AA02-DFA0A04FC94B}">
-              <ma14:wrappingTextBoxFlag xmlns:ma14="http://schemas.microsoft.com/office/mac/drawingml/2011/main" val="1"/>
+              <ma14:wrappingTextBoxFlag xmlns:ma14="http://schemas.microsoft.com/office/mac/drawingml/2011/main" xmlns:a14="http://schemas.microsoft.com/office/drawing/2010/main" xmlns:m="http://schemas.openxmlformats.org/officeDocument/2006/math" xmlns="" val="1"/>
             </a:ext>
           </a:extLst>
         </p:spPr>
@@ -4365,6 +4432,7 @@
             <a:pPr>
               <a:defRPr sz="3500"/>
             </a:pPr>
+            <a:endParaRPr/>
           </a:p>
           <a:p>
             <a:pPr>
@@ -4429,12 +4497,12 @@
   <p:clrMapOvr>
     <a:masterClrMapping/>
   </p:clrMapOvr>
-  <p:transition xmlns:p14="http://schemas.microsoft.com/office/powerpoint/2010/main" spd="med" advClick="1"/>
+  <p:transition spd="med"/>
 </p:sld>
 </file>
 
 <file path=ppt/slides/slide8.xml><?xml version="1.0" encoding="utf-8"?>
-<p:sld xmlns:a="http://schemas.openxmlformats.org/drawingml/2006/main" xmlns:r="http://schemas.openxmlformats.org/officeDocument/2006/relationships" xmlns:p="http://schemas.openxmlformats.org/presentationml/2006/main" xmlns:m="http://schemas.openxmlformats.org/officeDocument/2006/math" xmlns:a14="http://schemas.microsoft.com/office/drawing/2010/main" showMasterSp="1" showMasterPhAnim="1">
+<p:sld xmlns:a="http://schemas.openxmlformats.org/drawingml/2006/main" xmlns:r="http://schemas.openxmlformats.org/officeDocument/2006/relationships" xmlns:p="http://schemas.openxmlformats.org/presentationml/2006/main">
   <p:cSld>
     <p:spTree>
       <p:nvGrpSpPr>
@@ -4469,7 +4537,7 @@
           </a:ln>
           <a:extLst>
             <a:ext uri="{C572A759-6A51-4108-AA02-DFA0A04FC94B}">
-              <ma14:wrappingTextBoxFlag xmlns:ma14="http://schemas.microsoft.com/office/mac/drawingml/2011/main" val="1"/>
+              <ma14:wrappingTextBoxFlag xmlns:ma14="http://schemas.microsoft.com/office/mac/drawingml/2011/main" xmlns:a14="http://schemas.microsoft.com/office/drawing/2010/main" xmlns:m="http://schemas.openxmlformats.org/officeDocument/2006/math" xmlns="" val="1"/>
             </a:ext>
           </a:extLst>
         </p:spPr>
@@ -4528,7 +4596,7 @@
           </a:ln>
           <a:extLst>
             <a:ext uri="{C572A759-6A51-4108-AA02-DFA0A04FC94B}">
-              <ma14:wrappingTextBoxFlag xmlns:ma14="http://schemas.microsoft.com/office/mac/drawingml/2011/main" val="1"/>
+              <ma14:wrappingTextBoxFlag xmlns:ma14="http://schemas.microsoft.com/office/mac/drawingml/2011/main" xmlns:a14="http://schemas.microsoft.com/office/drawing/2010/main" xmlns:m="http://schemas.openxmlformats.org/officeDocument/2006/math" xmlns="" val="1"/>
             </a:ext>
           </a:extLst>
         </p:spPr>
@@ -4549,6 +4617,7 @@
             <a:pPr>
               <a:defRPr sz="3500"/>
             </a:pPr>
+            <a:endParaRPr/>
           </a:p>
           <a:p>
             <a:pPr algn="l" defTabSz="457200">
@@ -4622,6 +4691,7 @@
                 <a:sym typeface="Consolas"/>
               </a:defRPr>
             </a:pPr>
+            <a:endParaRPr/>
           </a:p>
           <a:p>
             <a:pPr algn="l" defTabSz="457200">
@@ -4665,6 +4735,7 @@
             <a:pPr>
               <a:defRPr sz="3500"/>
             </a:pPr>
+            <a:endParaRPr/>
           </a:p>
           <a:p>
             <a:pPr algn="l" defTabSz="457200">
@@ -4704,11 +4775,13 @@
             <a:pPr>
               <a:defRPr sz="3500"/>
             </a:pPr>
+            <a:endParaRPr/>
           </a:p>
           <a:p>
             <a:pPr>
               <a:defRPr sz="3500"/>
             </a:pPr>
+            <a:endParaRPr/>
           </a:p>
         </p:txBody>
       </p:sp>
@@ -4717,12 +4790,12 @@
   <p:clrMapOvr>
     <a:masterClrMapping/>
   </p:clrMapOvr>
-  <p:transition xmlns:p14="http://schemas.microsoft.com/office/powerpoint/2010/main" spd="med" advClick="1"/>
+  <p:transition spd="med"/>
 </p:sld>
 </file>
 
 <file path=ppt/slides/slide9.xml><?xml version="1.0" encoding="utf-8"?>
-<p:sld xmlns:a="http://schemas.openxmlformats.org/drawingml/2006/main" xmlns:r="http://schemas.openxmlformats.org/officeDocument/2006/relationships" xmlns:p="http://schemas.openxmlformats.org/presentationml/2006/main" xmlns:m="http://schemas.openxmlformats.org/officeDocument/2006/math" xmlns:a14="http://schemas.microsoft.com/office/drawing/2010/main" showMasterSp="1" showMasterPhAnim="1">
+<p:sld xmlns:a="http://schemas.openxmlformats.org/drawingml/2006/main" xmlns:r="http://schemas.openxmlformats.org/officeDocument/2006/relationships" xmlns:p="http://schemas.openxmlformats.org/presentationml/2006/main">
   <p:cSld>
     <p:spTree>
       <p:nvGrpSpPr>
@@ -4757,7 +4830,7 @@
           </a:ln>
           <a:extLst>
             <a:ext uri="{C572A759-6A51-4108-AA02-DFA0A04FC94B}">
-              <ma14:wrappingTextBoxFlag xmlns:ma14="http://schemas.microsoft.com/office/mac/drawingml/2011/main" val="1"/>
+              <ma14:wrappingTextBoxFlag xmlns:ma14="http://schemas.microsoft.com/office/mac/drawingml/2011/main" xmlns:a14="http://schemas.microsoft.com/office/drawing/2010/main" xmlns:m="http://schemas.openxmlformats.org/officeDocument/2006/math" xmlns="" val="1"/>
             </a:ext>
           </a:extLst>
         </p:spPr>
@@ -4805,8 +4878,8 @@
         </p:nvSpPr>
         <p:spPr>
           <a:xfrm>
-            <a:off x="431611" y="3085678"/>
-            <a:ext cx="12431228" cy="5461001"/>
+            <a:off x="431611" y="3353966"/>
+            <a:ext cx="12431228" cy="4924425"/>
           </a:xfrm>
           <a:prstGeom prst="rect">
             <a:avLst/>
@@ -4816,7 +4889,7 @@
           </a:ln>
           <a:extLst>
             <a:ext uri="{C572A759-6A51-4108-AA02-DFA0A04FC94B}">
-              <ma14:wrappingTextBoxFlag xmlns:ma14="http://schemas.microsoft.com/office/mac/drawingml/2011/main" val="1"/>
+              <ma14:wrappingTextBoxFlag xmlns:ma14="http://schemas.microsoft.com/office/mac/drawingml/2011/main" xmlns:a14="http://schemas.microsoft.com/office/drawing/2010/main" xmlns:m="http://schemas.openxmlformats.org/officeDocument/2006/math" xmlns="" val="1"/>
             </a:ext>
           </a:extLst>
         </p:spPr>
@@ -4830,19 +4903,23 @@
               <a:defRPr sz="3500"/>
             </a:pPr>
             <a:r>
+              <a:rPr dirty="0" err="1"/>
               <a:t>gets.chomp</a:t>
             </a:r>
+            <a:endParaRPr dirty="0"/>
           </a:p>
           <a:p>
             <a:pPr>
               <a:defRPr sz="3500"/>
             </a:pPr>
+            <a:endParaRPr dirty="0"/>
           </a:p>
           <a:p>
             <a:pPr>
               <a:defRPr sz="3500"/>
             </a:pPr>
             <a:r>
+              <a:rPr dirty="0"/>
               <a:t>GETS</a:t>
             </a:r>
           </a:p>
@@ -4851,6 +4928,7 @@
               <a:defRPr sz="3500"/>
             </a:pPr>
             <a:r>
+              <a:rPr dirty="0"/>
               <a:t>Grabs the input from the user</a:t>
             </a:r>
           </a:p>
@@ -4859,19 +4937,30 @@
               <a:defRPr sz="3500"/>
             </a:pPr>
             <a:r>
-              <a:t>and ads a line-return at the end</a:t>
+              <a:rPr dirty="0"/>
+              <a:t>and ad</a:t>
+            </a:r>
+            <a:r>
+              <a:rPr lang="en-CA" dirty="0"/>
+              <a:t>d</a:t>
+            </a:r>
+            <a:r>
+              <a:rPr dirty="0"/>
+              <a:t>s a line-return at the end</a:t>
             </a:r>
           </a:p>
           <a:p>
             <a:pPr>
               <a:defRPr sz="3500"/>
             </a:pPr>
+            <a:endParaRPr dirty="0"/>
           </a:p>
           <a:p>
             <a:pPr>
               <a:defRPr sz="3500"/>
             </a:pPr>
             <a:r>
+              <a:rPr dirty="0"/>
               <a:t>CHOMP</a:t>
             </a:r>
           </a:p>
@@ -4880,6 +4969,7 @@
               <a:defRPr sz="3500"/>
             </a:pPr>
             <a:r>
+              <a:rPr dirty="0"/>
               <a:t>Removes said line-return</a:t>
             </a:r>
           </a:p>
@@ -4888,16 +4978,11 @@
               <a:defRPr sz="3500"/>
             </a:pPr>
             <a:r>
-              <a:t>(to have </a:t>
-            </a:r>
-            <a:r>
-              <a:t>clean</a:t>
-            </a:r>
-            <a:r>
-              <a:t> data from the user </a:t>
-            </a:r>
-            <a:r>
-              <a:rPr>
+              <a:rPr dirty="0"/>
+              <a:t>(to have clean data from the user </a:t>
+            </a:r>
+            <a:r>
+              <a:rPr dirty="0">
                 <a:latin typeface="Apple Color Emoji"/>
                 <a:ea typeface="Apple Color Emoji"/>
                 <a:cs typeface="Apple Color Emoji"/>
@@ -4906,6 +4991,7 @@
               <a:t>😊</a:t>
             </a:r>
             <a:r>
+              <a:rPr dirty="0"/>
               <a:t>)</a:t>
             </a:r>
           </a:p>
@@ -4916,12 +5002,12 @@
   <p:clrMapOvr>
     <a:masterClrMapping/>
   </p:clrMapOvr>
-  <p:transition xmlns:p14="http://schemas.microsoft.com/office/powerpoint/2010/main" spd="med" advClick="1"/>
+  <p:transition spd="med"/>
 </p:sld>
 </file>
 
 <file path=ppt/theme/theme1.xml><?xml version="1.0" encoding="utf-8"?>
-<a:theme xmlns:a="http://schemas.openxmlformats.org/drawingml/2006/main" xmlns:r="http://schemas.openxmlformats.org/officeDocument/2006/relationships" name="White">
+<a:theme xmlns:a="http://schemas.openxmlformats.org/drawingml/2006/main" name="White">
   <a:themeElements>
     <a:clrScheme name="White">
       <a:dk1>
@@ -5047,7 +5133,7 @@
       <a:effectStyleLst>
         <a:effectStyle>
           <a:effectLst>
-            <a:outerShdw sx="100000" sy="100000" kx="0" ky="0" algn="b" rotWithShape="0" blurRad="25400" dist="12700" dir="5400000">
+            <a:outerShdw blurRad="25400" dist="12700" dir="5400000" rotWithShape="0">
               <a:srgbClr val="000000">
                 <a:alpha val="50000"/>
               </a:srgbClr>
@@ -5056,7 +5142,7 @@
         </a:effectStyle>
         <a:effectStyle>
           <a:effectLst>
-            <a:outerShdw sx="100000" sy="100000" kx="0" ky="0" algn="b" rotWithShape="0" blurRad="25400" dist="0" dir="0">
+            <a:outerShdw blurRad="25400" rotWithShape="0">
               <a:srgbClr val="000000">
                 <a:alpha val="50000"/>
               </a:srgbClr>
@@ -5065,7 +5151,7 @@
         </a:effectStyle>
         <a:effectStyle>
           <a:effectLst>
-            <a:outerShdw sx="100000" sy="100000" kx="0" ky="0" algn="b" rotWithShape="0" blurRad="25400" dist="12700" dir="5400000">
+            <a:outerShdw blurRad="25400" dist="12700" dir="5400000" rotWithShape="0">
               <a:srgbClr val="000000">
                 <a:alpha val="50000"/>
               </a:srgbClr>
@@ -5129,8 +5215,8 @@
     <a:spDef>
       <a:spPr>
         <a:blipFill rotWithShape="1">
-          <a:blip r:embed="rId1"/>
-          <a:srcRect l="0" t="0" r="0" b="0"/>
+          <a:blip xmlns:r="http://schemas.openxmlformats.org/officeDocument/2006/relationships" r:embed="rId1"/>
+          <a:srcRect/>
           <a:tile tx="0" ty="0" sx="100000" sy="100000" flip="none" algn="tl"/>
         </a:blipFill>
         <a:ln w="3175" cap="flat">
@@ -5138,7 +5224,7 @@
           <a:miter lim="400000"/>
         </a:ln>
         <a:effectLst>
-          <a:outerShdw sx="100000" sy="100000" kx="0" ky="0" algn="b" rotWithShape="0" blurRad="25400" dist="12700" dir="5400000">
+          <a:outerShdw blurRad="25400" dist="12700" dir="5400000" rotWithShape="0">
             <a:srgbClr val="000000">
               <a:alpha val="50000"/>
             </a:srgbClr>
@@ -5146,7 +5232,7 @@
         </a:effectLst>
         <a:sp3d/>
       </a:spPr>
-      <a:bodyPr rot="0" spcFirstLastPara="1" vertOverflow="overflow" horzOverflow="overflow" vert="horz" wrap="square" lIns="38100" tIns="38100" rIns="38100" bIns="38100" numCol="1" spcCol="38100" rtlCol="0" anchor="ctr" upright="0">
+      <a:bodyPr rot="0" spcFirstLastPara="1" vertOverflow="overflow" horzOverflow="overflow" vert="horz" wrap="square" lIns="38100" tIns="38100" rIns="38100" bIns="38100" numCol="1" spcCol="38100" rtlCol="0" anchor="ctr">
         <a:spAutoFit/>
       </a:bodyPr>
       <a:lstStyle>
@@ -5165,7 +5251,7 @@
           <a:buFontTx/>
           <a:buNone/>
           <a:tabLst/>
-          <a:defRPr b="0" baseline="0" cap="none" i="0" spc="0" strike="noStrike" sz="2200" u="none" kumimoji="0" normalizeH="0">
+          <a:defRPr kumimoji="0" sz="2200" b="0" i="0" u="none" strike="noStrike" cap="none" spc="0" normalizeH="0" baseline="0">
             <a:ln>
               <a:noFill/>
             </a:ln>
@@ -5195,7 +5281,7 @@
           <a:buFontTx/>
           <a:buNone/>
           <a:tabLst/>
-          <a:defRPr b="0" baseline="0" cap="none" i="0" spc="0" strike="noStrike" sz="1800" u="none" kumimoji="0" normalizeH="0">
+          <a:defRPr kumimoji="0" sz="1800" b="0" i="0" u="none" strike="noStrike" cap="none" spc="0" normalizeH="0" baseline="0">
             <a:ln>
               <a:noFill/>
             </a:ln>
@@ -5221,7 +5307,7 @@
           <a:buFontTx/>
           <a:buNone/>
           <a:tabLst/>
-          <a:defRPr b="0" baseline="0" cap="none" i="0" spc="0" strike="noStrike" sz="1800" u="none" kumimoji="0" normalizeH="0">
+          <a:defRPr kumimoji="0" sz="1800" b="0" i="0" u="none" strike="noStrike" cap="none" spc="0" normalizeH="0" baseline="0">
             <a:ln>
               <a:noFill/>
             </a:ln>
@@ -5247,7 +5333,7 @@
           <a:buFontTx/>
           <a:buNone/>
           <a:tabLst/>
-          <a:defRPr b="0" baseline="0" cap="none" i="0" spc="0" strike="noStrike" sz="1800" u="none" kumimoji="0" normalizeH="0">
+          <a:defRPr kumimoji="0" sz="1800" b="0" i="0" u="none" strike="noStrike" cap="none" spc="0" normalizeH="0" baseline="0">
             <a:ln>
               <a:noFill/>
             </a:ln>
@@ -5273,7 +5359,7 @@
           <a:buFontTx/>
           <a:buNone/>
           <a:tabLst/>
-          <a:defRPr b="0" baseline="0" cap="none" i="0" spc="0" strike="noStrike" sz="1800" u="none" kumimoji="0" normalizeH="0">
+          <a:defRPr kumimoji="0" sz="1800" b="0" i="0" u="none" strike="noStrike" cap="none" spc="0" normalizeH="0" baseline="0">
             <a:ln>
               <a:noFill/>
             </a:ln>
@@ -5299,7 +5385,7 @@
           <a:buFontTx/>
           <a:buNone/>
           <a:tabLst/>
-          <a:defRPr b="0" baseline="0" cap="none" i="0" spc="0" strike="noStrike" sz="1800" u="none" kumimoji="0" normalizeH="0">
+          <a:defRPr kumimoji="0" sz="1800" b="0" i="0" u="none" strike="noStrike" cap="none" spc="0" normalizeH="0" baseline="0">
             <a:ln>
               <a:noFill/>
             </a:ln>
@@ -5325,7 +5411,7 @@
           <a:buFontTx/>
           <a:buNone/>
           <a:tabLst/>
-          <a:defRPr b="0" baseline="0" cap="none" i="0" spc="0" strike="noStrike" sz="1800" u="none" kumimoji="0" normalizeH="0">
+          <a:defRPr kumimoji="0" sz="1800" b="0" i="0" u="none" strike="noStrike" cap="none" spc="0" normalizeH="0" baseline="0">
             <a:ln>
               <a:noFill/>
             </a:ln>
@@ -5351,7 +5437,7 @@
           <a:buFontTx/>
           <a:buNone/>
           <a:tabLst/>
-          <a:defRPr b="0" baseline="0" cap="none" i="0" spc="0" strike="noStrike" sz="1800" u="none" kumimoji="0" normalizeH="0">
+          <a:defRPr kumimoji="0" sz="1800" b="0" i="0" u="none" strike="noStrike" cap="none" spc="0" normalizeH="0" baseline="0">
             <a:ln>
               <a:noFill/>
             </a:ln>
@@ -5377,7 +5463,7 @@
           <a:buFontTx/>
           <a:buNone/>
           <a:tabLst/>
-          <a:defRPr b="0" baseline="0" cap="none" i="0" spc="0" strike="noStrike" sz="1800" u="none" kumimoji="0" normalizeH="0">
+          <a:defRPr kumimoji="0" sz="1800" b="0" i="0" u="none" strike="noStrike" cap="none" spc="0" normalizeH="0" baseline="0">
             <a:ln>
               <a:noFill/>
             </a:ln>
@@ -5403,7 +5489,7 @@
           <a:buFontTx/>
           <a:buNone/>
           <a:tabLst/>
-          <a:defRPr b="0" baseline="0" cap="none" i="0" spc="0" strike="noStrike" sz="1800" u="none" kumimoji="0" normalizeH="0">
+          <a:defRPr kumimoji="0" sz="1800" b="0" i="0" u="none" strike="noStrike" cap="none" spc="0" normalizeH="0" baseline="0">
             <a:ln>
               <a:noFill/>
             </a:ln>
@@ -5416,9 +5502,15 @@
         </a:lvl9pPr>
       </a:lstStyle>
       <a:style>
-        <a:lnRef idx="0"/>
-        <a:fillRef idx="0"/>
-        <a:effectRef idx="0"/>
+        <a:lnRef idx="0">
+          <a:scrgbClr r="0" g="0" b="0"/>
+        </a:lnRef>
+        <a:fillRef idx="0">
+          <a:scrgbClr r="0" g="0" b="0"/>
+        </a:fillRef>
+        <a:effectRef idx="0">
+          <a:scrgbClr r="0" g="0" b="0"/>
+        </a:effectRef>
         <a:fontRef idx="none"/>
       </a:style>
     </a:spDef>
@@ -5435,7 +5527,7 @@
         <a:effectLst/>
         <a:sp3d/>
       </a:spPr>
-      <a:bodyPr rot="0" spcFirstLastPara="1" vertOverflow="overflow" horzOverflow="overflow" vert="horz" wrap="square" lIns="91439" tIns="45719" rIns="91439" bIns="45719" numCol="1" spcCol="38100" rtlCol="0" anchor="t" upright="0">
+      <a:bodyPr rot="0" spcFirstLastPara="1" vertOverflow="overflow" horzOverflow="overflow" vert="horz" wrap="square" lIns="91439" tIns="45719" rIns="91439" bIns="45719" numCol="1" spcCol="38100" rtlCol="0" anchor="t">
         <a:noAutofit/>
       </a:bodyPr>
       <a:lstStyle>
@@ -5454,7 +5546,7 @@
           <a:buFontTx/>
           <a:buNone/>
           <a:tabLst/>
-          <a:defRPr b="0" baseline="0" cap="none" i="0" spc="0" strike="noStrike" sz="1800" u="none" kumimoji="0" normalizeH="0">
+          <a:defRPr kumimoji="0" sz="1800" b="0" i="0" u="none" strike="noStrike" cap="none" spc="0" normalizeH="0" baseline="0">
             <a:ln>
               <a:noFill/>
             </a:ln>
@@ -5480,7 +5572,7 @@
           <a:buFontTx/>
           <a:buNone/>
           <a:tabLst/>
-          <a:defRPr b="0" baseline="0" cap="none" i="0" spc="0" strike="noStrike" sz="1800" u="none" kumimoji="0" normalizeH="0">
+          <a:defRPr kumimoji="0" sz="1800" b="0" i="0" u="none" strike="noStrike" cap="none" spc="0" normalizeH="0" baseline="0">
             <a:ln>
               <a:noFill/>
             </a:ln>
@@ -5506,7 +5598,7 @@
           <a:buFontTx/>
           <a:buNone/>
           <a:tabLst/>
-          <a:defRPr b="0" baseline="0" cap="none" i="0" spc="0" strike="noStrike" sz="1800" u="none" kumimoji="0" normalizeH="0">
+          <a:defRPr kumimoji="0" sz="1800" b="0" i="0" u="none" strike="noStrike" cap="none" spc="0" normalizeH="0" baseline="0">
             <a:ln>
               <a:noFill/>
             </a:ln>
@@ -5532,7 +5624,7 @@
           <a:buFontTx/>
           <a:buNone/>
           <a:tabLst/>
-          <a:defRPr b="0" baseline="0" cap="none" i="0" spc="0" strike="noStrike" sz="1800" u="none" kumimoji="0" normalizeH="0">
+          <a:defRPr kumimoji="0" sz="1800" b="0" i="0" u="none" strike="noStrike" cap="none" spc="0" normalizeH="0" baseline="0">
             <a:ln>
               <a:noFill/>
             </a:ln>
@@ -5558,7 +5650,7 @@
           <a:buFontTx/>
           <a:buNone/>
           <a:tabLst/>
-          <a:defRPr b="0" baseline="0" cap="none" i="0" spc="0" strike="noStrike" sz="1800" u="none" kumimoji="0" normalizeH="0">
+          <a:defRPr kumimoji="0" sz="1800" b="0" i="0" u="none" strike="noStrike" cap="none" spc="0" normalizeH="0" baseline="0">
             <a:ln>
               <a:noFill/>
             </a:ln>
@@ -5584,7 +5676,7 @@
           <a:buFontTx/>
           <a:buNone/>
           <a:tabLst/>
-          <a:defRPr b="0" baseline="0" cap="none" i="0" spc="0" strike="noStrike" sz="1800" u="none" kumimoji="0" normalizeH="0">
+          <a:defRPr kumimoji="0" sz="1800" b="0" i="0" u="none" strike="noStrike" cap="none" spc="0" normalizeH="0" baseline="0">
             <a:ln>
               <a:noFill/>
             </a:ln>
@@ -5610,7 +5702,7 @@
           <a:buFontTx/>
           <a:buNone/>
           <a:tabLst/>
-          <a:defRPr b="0" baseline="0" cap="none" i="0" spc="0" strike="noStrike" sz="1800" u="none" kumimoji="0" normalizeH="0">
+          <a:defRPr kumimoji="0" sz="1800" b="0" i="0" u="none" strike="noStrike" cap="none" spc="0" normalizeH="0" baseline="0">
             <a:ln>
               <a:noFill/>
             </a:ln>
@@ -5636,7 +5728,7 @@
           <a:buFontTx/>
           <a:buNone/>
           <a:tabLst/>
-          <a:defRPr b="0" baseline="0" cap="none" i="0" spc="0" strike="noStrike" sz="1800" u="none" kumimoji="0" normalizeH="0">
+          <a:defRPr kumimoji="0" sz="1800" b="0" i="0" u="none" strike="noStrike" cap="none" spc="0" normalizeH="0" baseline="0">
             <a:ln>
               <a:noFill/>
             </a:ln>
@@ -5662,7 +5754,7 @@
           <a:buFontTx/>
           <a:buNone/>
           <a:tabLst/>
-          <a:defRPr b="0" baseline="0" cap="none" i="0" spc="0" strike="noStrike" sz="1800" u="none" kumimoji="0" normalizeH="0">
+          <a:defRPr kumimoji="0" sz="1800" b="0" i="0" u="none" strike="noStrike" cap="none" spc="0" normalizeH="0" baseline="0">
             <a:ln>
               <a:noFill/>
             </a:ln>
@@ -5688,7 +5780,7 @@
           <a:buFontTx/>
           <a:buNone/>
           <a:tabLst/>
-          <a:defRPr b="0" baseline="0" cap="none" i="0" spc="0" strike="noStrike" sz="1800" u="none" kumimoji="0" normalizeH="0">
+          <a:defRPr kumimoji="0" sz="1800" b="0" i="0" u="none" strike="noStrike" cap="none" spc="0" normalizeH="0" baseline="0">
             <a:ln>
               <a:noFill/>
             </a:ln>
@@ -5701,9 +5793,15 @@
         </a:lvl9pPr>
       </a:lstStyle>
       <a:style>
-        <a:lnRef idx="0"/>
-        <a:fillRef idx="0"/>
-        <a:effectRef idx="0"/>
+        <a:lnRef idx="0">
+          <a:scrgbClr r="0" g="0" b="0"/>
+        </a:lnRef>
+        <a:fillRef idx="0">
+          <a:scrgbClr r="0" g="0" b="0"/>
+        </a:fillRef>
+        <a:effectRef idx="0">
+          <a:scrgbClr r="0" g="0" b="0"/>
+        </a:effectRef>
         <a:fontRef idx="none"/>
       </a:style>
     </a:lnDef>
@@ -5717,7 +5815,7 @@
         <a:effectLst/>
         <a:sp3d/>
       </a:spPr>
-      <a:bodyPr rot="0" spcFirstLastPara="1" vertOverflow="overflow" horzOverflow="overflow" vert="horz" wrap="square" lIns="38100" tIns="38100" rIns="38100" bIns="38100" numCol="1" spcCol="38100" rtlCol="0" anchor="ctr" upright="0">
+      <a:bodyPr rot="0" spcFirstLastPara="1" vertOverflow="overflow" horzOverflow="overflow" vert="horz" wrap="square" lIns="38100" tIns="38100" rIns="38100" bIns="38100" numCol="1" spcCol="38100" rtlCol="0" anchor="ctr">
         <a:spAutoFit/>
       </a:bodyPr>
       <a:lstStyle>
@@ -5736,7 +5834,7 @@
           <a:buFontTx/>
           <a:buNone/>
           <a:tabLst/>
-          <a:defRPr b="0" baseline="0" cap="none" i="0" spc="0" strike="noStrike" sz="5800" u="none" kumimoji="0" normalizeH="0">
+          <a:defRPr kumimoji="0" sz="5800" b="0" i="0" u="none" strike="noStrike" cap="none" spc="0" normalizeH="0" baseline="0">
             <a:ln>
               <a:noFill/>
             </a:ln>
@@ -5766,7 +5864,7 @@
           <a:buFontTx/>
           <a:buNone/>
           <a:tabLst/>
-          <a:defRPr b="0" baseline="0" cap="none" i="0" spc="0" strike="noStrike" sz="1800" u="none" kumimoji="0" normalizeH="0">
+          <a:defRPr kumimoji="0" sz="1800" b="0" i="0" u="none" strike="noStrike" cap="none" spc="0" normalizeH="0" baseline="0">
             <a:ln>
               <a:noFill/>
             </a:ln>
@@ -5792,7 +5890,7 @@
           <a:buFontTx/>
           <a:buNone/>
           <a:tabLst/>
-          <a:defRPr b="0" baseline="0" cap="none" i="0" spc="0" strike="noStrike" sz="1800" u="none" kumimoji="0" normalizeH="0">
+          <a:defRPr kumimoji="0" sz="1800" b="0" i="0" u="none" strike="noStrike" cap="none" spc="0" normalizeH="0" baseline="0">
             <a:ln>
               <a:noFill/>
             </a:ln>
@@ -5818,7 +5916,7 @@
           <a:buFontTx/>
           <a:buNone/>
           <a:tabLst/>
-          <a:defRPr b="0" baseline="0" cap="none" i="0" spc="0" strike="noStrike" sz="1800" u="none" kumimoji="0" normalizeH="0">
+          <a:defRPr kumimoji="0" sz="1800" b="0" i="0" u="none" strike="noStrike" cap="none" spc="0" normalizeH="0" baseline="0">
             <a:ln>
               <a:noFill/>
             </a:ln>
@@ -5844,7 +5942,7 @@
           <a:buFontTx/>
           <a:buNone/>
           <a:tabLst/>
-          <a:defRPr b="0" baseline="0" cap="none" i="0" spc="0" strike="noStrike" sz="1800" u="none" kumimoji="0" normalizeH="0">
+          <a:defRPr kumimoji="0" sz="1800" b="0" i="0" u="none" strike="noStrike" cap="none" spc="0" normalizeH="0" baseline="0">
             <a:ln>
               <a:noFill/>
             </a:ln>
@@ -5870,7 +5968,7 @@
           <a:buFontTx/>
           <a:buNone/>
           <a:tabLst/>
-          <a:defRPr b="0" baseline="0" cap="none" i="0" spc="0" strike="noStrike" sz="1800" u="none" kumimoji="0" normalizeH="0">
+          <a:defRPr kumimoji="0" sz="1800" b="0" i="0" u="none" strike="noStrike" cap="none" spc="0" normalizeH="0" baseline="0">
             <a:ln>
               <a:noFill/>
             </a:ln>
@@ -5896,7 +5994,7 @@
           <a:buFontTx/>
           <a:buNone/>
           <a:tabLst/>
-          <a:defRPr b="0" baseline="0" cap="none" i="0" spc="0" strike="noStrike" sz="1800" u="none" kumimoji="0" normalizeH="0">
+          <a:defRPr kumimoji="0" sz="1800" b="0" i="0" u="none" strike="noStrike" cap="none" spc="0" normalizeH="0" baseline="0">
             <a:ln>
               <a:noFill/>
             </a:ln>
@@ -5922,7 +6020,7 @@
           <a:buFontTx/>
           <a:buNone/>
           <a:tabLst/>
-          <a:defRPr b="0" baseline="0" cap="none" i="0" spc="0" strike="noStrike" sz="1800" u="none" kumimoji="0" normalizeH="0">
+          <a:defRPr kumimoji="0" sz="1800" b="0" i="0" u="none" strike="noStrike" cap="none" spc="0" normalizeH="0" baseline="0">
             <a:ln>
               <a:noFill/>
             </a:ln>
@@ -5948,7 +6046,7 @@
           <a:buFontTx/>
           <a:buNone/>
           <a:tabLst/>
-          <a:defRPr b="0" baseline="0" cap="none" i="0" spc="0" strike="noStrike" sz="1800" u="none" kumimoji="0" normalizeH="0">
+          <a:defRPr kumimoji="0" sz="1800" b="0" i="0" u="none" strike="noStrike" cap="none" spc="0" normalizeH="0" baseline="0">
             <a:ln>
               <a:noFill/>
             </a:ln>
@@ -5974,7 +6072,7 @@
           <a:buFontTx/>
           <a:buNone/>
           <a:tabLst/>
-          <a:defRPr b="0" baseline="0" cap="none" i="0" spc="0" strike="noStrike" sz="1800" u="none" kumimoji="0" normalizeH="0">
+          <a:defRPr kumimoji="0" sz="1800" b="0" i="0" u="none" strike="noStrike" cap="none" spc="0" normalizeH="0" baseline="0">
             <a:ln>
               <a:noFill/>
             </a:ln>
@@ -5987,18 +6085,25 @@
         </a:lvl9pPr>
       </a:lstStyle>
       <a:style>
-        <a:lnRef idx="0"/>
-        <a:fillRef idx="0"/>
-        <a:effectRef idx="0"/>
+        <a:lnRef idx="0">
+          <a:scrgbClr r="0" g="0" b="0"/>
+        </a:lnRef>
+        <a:fillRef idx="0">
+          <a:scrgbClr r="0" g="0" b="0"/>
+        </a:fillRef>
+        <a:effectRef idx="0">
+          <a:scrgbClr r="0" g="0" b="0"/>
+        </a:effectRef>
         <a:fontRef idx="none"/>
       </a:style>
     </a:txDef>
   </a:objectDefaults>
+  <a:extraClrSchemeLst/>
 </a:theme>
 </file>
 
 <file path=ppt/theme/theme2.xml><?xml version="1.0" encoding="utf-8"?>
-<a:theme xmlns:a="http://schemas.openxmlformats.org/drawingml/2006/main" xmlns:r="http://schemas.openxmlformats.org/officeDocument/2006/relationships" name="White">
+<a:theme xmlns:a="http://schemas.openxmlformats.org/drawingml/2006/main" name="White">
   <a:themeElements>
     <a:clrScheme name="White">
       <a:dk1>
@@ -6124,7 +6229,7 @@
       <a:effectStyleLst>
         <a:effectStyle>
           <a:effectLst>
-            <a:outerShdw sx="100000" sy="100000" kx="0" ky="0" algn="b" rotWithShape="0" blurRad="25400" dist="12700" dir="5400000">
+            <a:outerShdw blurRad="25400" dist="12700" dir="5400000" rotWithShape="0">
               <a:srgbClr val="000000">
                 <a:alpha val="50000"/>
               </a:srgbClr>
@@ -6133,7 +6238,7 @@
         </a:effectStyle>
         <a:effectStyle>
           <a:effectLst>
-            <a:outerShdw sx="100000" sy="100000" kx="0" ky="0" algn="b" rotWithShape="0" blurRad="25400" dist="0" dir="0">
+            <a:outerShdw blurRad="25400" rotWithShape="0">
               <a:srgbClr val="000000">
                 <a:alpha val="50000"/>
               </a:srgbClr>
@@ -6142,7 +6247,7 @@
         </a:effectStyle>
         <a:effectStyle>
           <a:effectLst>
-            <a:outerShdw sx="100000" sy="100000" kx="0" ky="0" algn="b" rotWithShape="0" blurRad="25400" dist="12700" dir="5400000">
+            <a:outerShdw blurRad="25400" dist="12700" dir="5400000" rotWithShape="0">
               <a:srgbClr val="000000">
                 <a:alpha val="50000"/>
               </a:srgbClr>
@@ -6206,8 +6311,8 @@
     <a:spDef>
       <a:spPr>
         <a:blipFill rotWithShape="1">
-          <a:blip r:embed="rId1"/>
-          <a:srcRect l="0" t="0" r="0" b="0"/>
+          <a:blip xmlns:r="http://schemas.openxmlformats.org/officeDocument/2006/relationships" r:embed="rId1"/>
+          <a:srcRect/>
           <a:tile tx="0" ty="0" sx="100000" sy="100000" flip="none" algn="tl"/>
         </a:blipFill>
         <a:ln w="3175" cap="flat">
@@ -6215,7 +6320,7 @@
           <a:miter lim="400000"/>
         </a:ln>
         <a:effectLst>
-          <a:outerShdw sx="100000" sy="100000" kx="0" ky="0" algn="b" rotWithShape="0" blurRad="25400" dist="12700" dir="5400000">
+          <a:outerShdw blurRad="25400" dist="12700" dir="5400000" rotWithShape="0">
             <a:srgbClr val="000000">
               <a:alpha val="50000"/>
             </a:srgbClr>
@@ -6223,7 +6328,7 @@
         </a:effectLst>
         <a:sp3d/>
       </a:spPr>
-      <a:bodyPr rot="0" spcFirstLastPara="1" vertOverflow="overflow" horzOverflow="overflow" vert="horz" wrap="square" lIns="38100" tIns="38100" rIns="38100" bIns="38100" numCol="1" spcCol="38100" rtlCol="0" anchor="ctr" upright="0">
+      <a:bodyPr rot="0" spcFirstLastPara="1" vertOverflow="overflow" horzOverflow="overflow" vert="horz" wrap="square" lIns="38100" tIns="38100" rIns="38100" bIns="38100" numCol="1" spcCol="38100" rtlCol="0" anchor="ctr">
         <a:spAutoFit/>
       </a:bodyPr>
       <a:lstStyle>
@@ -6242,7 +6347,7 @@
           <a:buFontTx/>
           <a:buNone/>
           <a:tabLst/>
-          <a:defRPr b="0" baseline="0" cap="none" i="0" spc="0" strike="noStrike" sz="2200" u="none" kumimoji="0" normalizeH="0">
+          <a:defRPr kumimoji="0" sz="2200" b="0" i="0" u="none" strike="noStrike" cap="none" spc="0" normalizeH="0" baseline="0">
             <a:ln>
               <a:noFill/>
             </a:ln>
@@ -6272,7 +6377,7 @@
           <a:buFontTx/>
           <a:buNone/>
           <a:tabLst/>
-          <a:defRPr b="0" baseline="0" cap="none" i="0" spc="0" strike="noStrike" sz="1800" u="none" kumimoji="0" normalizeH="0">
+          <a:defRPr kumimoji="0" sz="1800" b="0" i="0" u="none" strike="noStrike" cap="none" spc="0" normalizeH="0" baseline="0">
             <a:ln>
               <a:noFill/>
             </a:ln>
@@ -6298,7 +6403,7 @@
           <a:buFontTx/>
           <a:buNone/>
           <a:tabLst/>
-          <a:defRPr b="0" baseline="0" cap="none" i="0" spc="0" strike="noStrike" sz="1800" u="none" kumimoji="0" normalizeH="0">
+          <a:defRPr kumimoji="0" sz="1800" b="0" i="0" u="none" strike="noStrike" cap="none" spc="0" normalizeH="0" baseline="0">
             <a:ln>
               <a:noFill/>
             </a:ln>
@@ -6324,7 +6429,7 @@
           <a:buFontTx/>
           <a:buNone/>
           <a:tabLst/>
-          <a:defRPr b="0" baseline="0" cap="none" i="0" spc="0" strike="noStrike" sz="1800" u="none" kumimoji="0" normalizeH="0">
+          <a:defRPr kumimoji="0" sz="1800" b="0" i="0" u="none" strike="noStrike" cap="none" spc="0" normalizeH="0" baseline="0">
             <a:ln>
               <a:noFill/>
             </a:ln>
@@ -6350,7 +6455,7 @@
           <a:buFontTx/>
           <a:buNone/>
           <a:tabLst/>
-          <a:defRPr b="0" baseline="0" cap="none" i="0" spc="0" strike="noStrike" sz="1800" u="none" kumimoji="0" normalizeH="0">
+          <a:defRPr kumimoji="0" sz="1800" b="0" i="0" u="none" strike="noStrike" cap="none" spc="0" normalizeH="0" baseline="0">
             <a:ln>
               <a:noFill/>
             </a:ln>
@@ -6376,7 +6481,7 @@
           <a:buFontTx/>
           <a:buNone/>
           <a:tabLst/>
-          <a:defRPr b="0" baseline="0" cap="none" i="0" spc="0" strike="noStrike" sz="1800" u="none" kumimoji="0" normalizeH="0">
+          <a:defRPr kumimoji="0" sz="1800" b="0" i="0" u="none" strike="noStrike" cap="none" spc="0" normalizeH="0" baseline="0">
             <a:ln>
               <a:noFill/>
             </a:ln>
@@ -6402,7 +6507,7 @@
           <a:buFontTx/>
           <a:buNone/>
           <a:tabLst/>
-          <a:defRPr b="0" baseline="0" cap="none" i="0" spc="0" strike="noStrike" sz="1800" u="none" kumimoji="0" normalizeH="0">
+          <a:defRPr kumimoji="0" sz="1800" b="0" i="0" u="none" strike="noStrike" cap="none" spc="0" normalizeH="0" baseline="0">
             <a:ln>
               <a:noFill/>
             </a:ln>
@@ -6428,7 +6533,7 @@
           <a:buFontTx/>
           <a:buNone/>
           <a:tabLst/>
-          <a:defRPr b="0" baseline="0" cap="none" i="0" spc="0" strike="noStrike" sz="1800" u="none" kumimoji="0" normalizeH="0">
+          <a:defRPr kumimoji="0" sz="1800" b="0" i="0" u="none" strike="noStrike" cap="none" spc="0" normalizeH="0" baseline="0">
             <a:ln>
               <a:noFill/>
             </a:ln>
@@ -6454,7 +6559,7 @@
           <a:buFontTx/>
           <a:buNone/>
           <a:tabLst/>
-          <a:defRPr b="0" baseline="0" cap="none" i="0" spc="0" strike="noStrike" sz="1800" u="none" kumimoji="0" normalizeH="0">
+          <a:defRPr kumimoji="0" sz="1800" b="0" i="0" u="none" strike="noStrike" cap="none" spc="0" normalizeH="0" baseline="0">
             <a:ln>
               <a:noFill/>
             </a:ln>
@@ -6480,7 +6585,7 @@
           <a:buFontTx/>
           <a:buNone/>
           <a:tabLst/>
-          <a:defRPr b="0" baseline="0" cap="none" i="0" spc="0" strike="noStrike" sz="1800" u="none" kumimoji="0" normalizeH="0">
+          <a:defRPr kumimoji="0" sz="1800" b="0" i="0" u="none" strike="noStrike" cap="none" spc="0" normalizeH="0" baseline="0">
             <a:ln>
               <a:noFill/>
             </a:ln>
@@ -6493,9 +6598,15 @@
         </a:lvl9pPr>
       </a:lstStyle>
       <a:style>
-        <a:lnRef idx="0"/>
-        <a:fillRef idx="0"/>
-        <a:effectRef idx="0"/>
+        <a:lnRef idx="0">
+          <a:scrgbClr r="0" g="0" b="0"/>
+        </a:lnRef>
+        <a:fillRef idx="0">
+          <a:scrgbClr r="0" g="0" b="0"/>
+        </a:fillRef>
+        <a:effectRef idx="0">
+          <a:scrgbClr r="0" g="0" b="0"/>
+        </a:effectRef>
         <a:fontRef idx="none"/>
       </a:style>
     </a:spDef>
@@ -6512,7 +6623,7 @@
         <a:effectLst/>
         <a:sp3d/>
       </a:spPr>
-      <a:bodyPr rot="0" spcFirstLastPara="1" vertOverflow="overflow" horzOverflow="overflow" vert="horz" wrap="square" lIns="91439" tIns="45719" rIns="91439" bIns="45719" numCol="1" spcCol="38100" rtlCol="0" anchor="t" upright="0">
+      <a:bodyPr rot="0" spcFirstLastPara="1" vertOverflow="overflow" horzOverflow="overflow" vert="horz" wrap="square" lIns="91439" tIns="45719" rIns="91439" bIns="45719" numCol="1" spcCol="38100" rtlCol="0" anchor="t">
         <a:noAutofit/>
       </a:bodyPr>
       <a:lstStyle>
@@ -6531,7 +6642,7 @@
           <a:buFontTx/>
           <a:buNone/>
           <a:tabLst/>
-          <a:defRPr b="0" baseline="0" cap="none" i="0" spc="0" strike="noStrike" sz="1800" u="none" kumimoji="0" normalizeH="0">
+          <a:defRPr kumimoji="0" sz="1800" b="0" i="0" u="none" strike="noStrike" cap="none" spc="0" normalizeH="0" baseline="0">
             <a:ln>
               <a:noFill/>
             </a:ln>
@@ -6557,7 +6668,7 @@
           <a:buFontTx/>
           <a:buNone/>
           <a:tabLst/>
-          <a:defRPr b="0" baseline="0" cap="none" i="0" spc="0" strike="noStrike" sz="1800" u="none" kumimoji="0" normalizeH="0">
+          <a:defRPr kumimoji="0" sz="1800" b="0" i="0" u="none" strike="noStrike" cap="none" spc="0" normalizeH="0" baseline="0">
             <a:ln>
               <a:noFill/>
             </a:ln>
@@ -6583,7 +6694,7 @@
           <a:buFontTx/>
           <a:buNone/>
           <a:tabLst/>
-          <a:defRPr b="0" baseline="0" cap="none" i="0" spc="0" strike="noStrike" sz="1800" u="none" kumimoji="0" normalizeH="0">
+          <a:defRPr kumimoji="0" sz="1800" b="0" i="0" u="none" strike="noStrike" cap="none" spc="0" normalizeH="0" baseline="0">
             <a:ln>
               <a:noFill/>
             </a:ln>
@@ -6609,7 +6720,7 @@
           <a:buFontTx/>
           <a:buNone/>
           <a:tabLst/>
-          <a:defRPr b="0" baseline="0" cap="none" i="0" spc="0" strike="noStrike" sz="1800" u="none" kumimoji="0" normalizeH="0">
+          <a:defRPr kumimoji="0" sz="1800" b="0" i="0" u="none" strike="noStrike" cap="none" spc="0" normalizeH="0" baseline="0">
             <a:ln>
               <a:noFill/>
             </a:ln>
@@ -6635,7 +6746,7 @@
           <a:buFontTx/>
           <a:buNone/>
           <a:tabLst/>
-          <a:defRPr b="0" baseline="0" cap="none" i="0" spc="0" strike="noStrike" sz="1800" u="none" kumimoji="0" normalizeH="0">
+          <a:defRPr kumimoji="0" sz="1800" b="0" i="0" u="none" strike="noStrike" cap="none" spc="0" normalizeH="0" baseline="0">
             <a:ln>
               <a:noFill/>
             </a:ln>
@@ -6661,7 +6772,7 @@
           <a:buFontTx/>
           <a:buNone/>
           <a:tabLst/>
-          <a:defRPr b="0" baseline="0" cap="none" i="0" spc="0" strike="noStrike" sz="1800" u="none" kumimoji="0" normalizeH="0">
+          <a:defRPr kumimoji="0" sz="1800" b="0" i="0" u="none" strike="noStrike" cap="none" spc="0" normalizeH="0" baseline="0">
             <a:ln>
               <a:noFill/>
             </a:ln>
@@ -6687,7 +6798,7 @@
           <a:buFontTx/>
           <a:buNone/>
           <a:tabLst/>
-          <a:defRPr b="0" baseline="0" cap="none" i="0" spc="0" strike="noStrike" sz="1800" u="none" kumimoji="0" normalizeH="0">
+          <a:defRPr kumimoji="0" sz="1800" b="0" i="0" u="none" strike="noStrike" cap="none" spc="0" normalizeH="0" baseline="0">
             <a:ln>
               <a:noFill/>
             </a:ln>
@@ -6713,7 +6824,7 @@
           <a:buFontTx/>
           <a:buNone/>
           <a:tabLst/>
-          <a:defRPr b="0" baseline="0" cap="none" i="0" spc="0" strike="noStrike" sz="1800" u="none" kumimoji="0" normalizeH="0">
+          <a:defRPr kumimoji="0" sz="1800" b="0" i="0" u="none" strike="noStrike" cap="none" spc="0" normalizeH="0" baseline="0">
             <a:ln>
               <a:noFill/>
             </a:ln>
@@ -6739,7 +6850,7 @@
           <a:buFontTx/>
           <a:buNone/>
           <a:tabLst/>
-          <a:defRPr b="0" baseline="0" cap="none" i="0" spc="0" strike="noStrike" sz="1800" u="none" kumimoji="0" normalizeH="0">
+          <a:defRPr kumimoji="0" sz="1800" b="0" i="0" u="none" strike="noStrike" cap="none" spc="0" normalizeH="0" baseline="0">
             <a:ln>
               <a:noFill/>
             </a:ln>
@@ -6765,7 +6876,7 @@
           <a:buFontTx/>
           <a:buNone/>
           <a:tabLst/>
-          <a:defRPr b="0" baseline="0" cap="none" i="0" spc="0" strike="noStrike" sz="1800" u="none" kumimoji="0" normalizeH="0">
+          <a:defRPr kumimoji="0" sz="1800" b="0" i="0" u="none" strike="noStrike" cap="none" spc="0" normalizeH="0" baseline="0">
             <a:ln>
               <a:noFill/>
             </a:ln>
@@ -6778,9 +6889,15 @@
         </a:lvl9pPr>
       </a:lstStyle>
       <a:style>
-        <a:lnRef idx="0"/>
-        <a:fillRef idx="0"/>
-        <a:effectRef idx="0"/>
+        <a:lnRef idx="0">
+          <a:scrgbClr r="0" g="0" b="0"/>
+        </a:lnRef>
+        <a:fillRef idx="0">
+          <a:scrgbClr r="0" g="0" b="0"/>
+        </a:fillRef>
+        <a:effectRef idx="0">
+          <a:scrgbClr r="0" g="0" b="0"/>
+        </a:effectRef>
         <a:fontRef idx="none"/>
       </a:style>
     </a:lnDef>
@@ -6794,7 +6911,7 @@
         <a:effectLst/>
         <a:sp3d/>
       </a:spPr>
-      <a:bodyPr rot="0" spcFirstLastPara="1" vertOverflow="overflow" horzOverflow="overflow" vert="horz" wrap="square" lIns="38100" tIns="38100" rIns="38100" bIns="38100" numCol="1" spcCol="38100" rtlCol="0" anchor="ctr" upright="0">
+      <a:bodyPr rot="0" spcFirstLastPara="1" vertOverflow="overflow" horzOverflow="overflow" vert="horz" wrap="square" lIns="38100" tIns="38100" rIns="38100" bIns="38100" numCol="1" spcCol="38100" rtlCol="0" anchor="ctr">
         <a:spAutoFit/>
       </a:bodyPr>
       <a:lstStyle>
@@ -6813,7 +6930,7 @@
           <a:buFontTx/>
           <a:buNone/>
           <a:tabLst/>
-          <a:defRPr b="0" baseline="0" cap="none" i="0" spc="0" strike="noStrike" sz="5800" u="none" kumimoji="0" normalizeH="0">
+          <a:defRPr kumimoji="0" sz="5800" b="0" i="0" u="none" strike="noStrike" cap="none" spc="0" normalizeH="0" baseline="0">
             <a:ln>
               <a:noFill/>
             </a:ln>
@@ -6843,7 +6960,7 @@
           <a:buFontTx/>
           <a:buNone/>
           <a:tabLst/>
-          <a:defRPr b="0" baseline="0" cap="none" i="0" spc="0" strike="noStrike" sz="1800" u="none" kumimoji="0" normalizeH="0">
+          <a:defRPr kumimoji="0" sz="1800" b="0" i="0" u="none" strike="noStrike" cap="none" spc="0" normalizeH="0" baseline="0">
             <a:ln>
               <a:noFill/>
             </a:ln>
@@ -6869,7 +6986,7 @@
           <a:buFontTx/>
           <a:buNone/>
           <a:tabLst/>
-          <a:defRPr b="0" baseline="0" cap="none" i="0" spc="0" strike="noStrike" sz="1800" u="none" kumimoji="0" normalizeH="0">
+          <a:defRPr kumimoji="0" sz="1800" b="0" i="0" u="none" strike="noStrike" cap="none" spc="0" normalizeH="0" baseline="0">
             <a:ln>
               <a:noFill/>
             </a:ln>
@@ -6895,7 +7012,7 @@
           <a:buFontTx/>
           <a:buNone/>
           <a:tabLst/>
-          <a:defRPr b="0" baseline="0" cap="none" i="0" spc="0" strike="noStrike" sz="1800" u="none" kumimoji="0" normalizeH="0">
+          <a:defRPr kumimoji="0" sz="1800" b="0" i="0" u="none" strike="noStrike" cap="none" spc="0" normalizeH="0" baseline="0">
             <a:ln>
               <a:noFill/>
             </a:ln>
@@ -6921,7 +7038,7 @@
           <a:buFontTx/>
           <a:buNone/>
           <a:tabLst/>
-          <a:defRPr b="0" baseline="0" cap="none" i="0" spc="0" strike="noStrike" sz="1800" u="none" kumimoji="0" normalizeH="0">
+          <a:defRPr kumimoji="0" sz="1800" b="0" i="0" u="none" strike="noStrike" cap="none" spc="0" normalizeH="0" baseline="0">
             <a:ln>
               <a:noFill/>
             </a:ln>
@@ -6947,7 +7064,7 @@
           <a:buFontTx/>
           <a:buNone/>
           <a:tabLst/>
-          <a:defRPr b="0" baseline="0" cap="none" i="0" spc="0" strike="noStrike" sz="1800" u="none" kumimoji="0" normalizeH="0">
+          <a:defRPr kumimoji="0" sz="1800" b="0" i="0" u="none" strike="noStrike" cap="none" spc="0" normalizeH="0" baseline="0">
             <a:ln>
               <a:noFill/>
             </a:ln>
@@ -6973,7 +7090,7 @@
           <a:buFontTx/>
           <a:buNone/>
           <a:tabLst/>
-          <a:defRPr b="0" baseline="0" cap="none" i="0" spc="0" strike="noStrike" sz="1800" u="none" kumimoji="0" normalizeH="0">
+          <a:defRPr kumimoji="0" sz="1800" b="0" i="0" u="none" strike="noStrike" cap="none" spc="0" normalizeH="0" baseline="0">
             <a:ln>
               <a:noFill/>
             </a:ln>
@@ -6999,7 +7116,7 @@
           <a:buFontTx/>
           <a:buNone/>
           <a:tabLst/>
-          <a:defRPr b="0" baseline="0" cap="none" i="0" spc="0" strike="noStrike" sz="1800" u="none" kumimoji="0" normalizeH="0">
+          <a:defRPr kumimoji="0" sz="1800" b="0" i="0" u="none" strike="noStrike" cap="none" spc="0" normalizeH="0" baseline="0">
             <a:ln>
               <a:noFill/>
             </a:ln>
@@ -7025,7 +7142,7 @@
           <a:buFontTx/>
           <a:buNone/>
           <a:tabLst/>
-          <a:defRPr b="0" baseline="0" cap="none" i="0" spc="0" strike="noStrike" sz="1800" u="none" kumimoji="0" normalizeH="0">
+          <a:defRPr kumimoji="0" sz="1800" b="0" i="0" u="none" strike="noStrike" cap="none" spc="0" normalizeH="0" baseline="0">
             <a:ln>
               <a:noFill/>
             </a:ln>
@@ -7051,7 +7168,7 @@
           <a:buFontTx/>
           <a:buNone/>
           <a:tabLst/>
-          <a:defRPr b="0" baseline="0" cap="none" i="0" spc="0" strike="noStrike" sz="1800" u="none" kumimoji="0" normalizeH="0">
+          <a:defRPr kumimoji="0" sz="1800" b="0" i="0" u="none" strike="noStrike" cap="none" spc="0" normalizeH="0" baseline="0">
             <a:ln>
               <a:noFill/>
             </a:ln>
@@ -7064,12 +7181,19 @@
         </a:lvl9pPr>
       </a:lstStyle>
       <a:style>
-        <a:lnRef idx="0"/>
-        <a:fillRef idx="0"/>
-        <a:effectRef idx="0"/>
+        <a:lnRef idx="0">
+          <a:scrgbClr r="0" g="0" b="0"/>
+        </a:lnRef>
+        <a:fillRef idx="0">
+          <a:scrgbClr r="0" g="0" b="0"/>
+        </a:fillRef>
+        <a:effectRef idx="0">
+          <a:scrgbClr r="0" g="0" b="0"/>
+        </a:effectRef>
         <a:fontRef idx="none"/>
       </a:style>
     </a:txDef>
   </a:objectDefaults>
+  <a:extraClrSchemeLst/>
 </a:theme>
 </file>
</xml_diff>